<commit_message>
Atualização do slide service
</commit_message>
<xml_diff>
--- a/Slides Android/04 - Componentes/Aula 02 - Service.pptx
+++ b/Slides Android/04 - Componentes/Aula 02 - Service.pptx
@@ -7,20 +7,19 @@
   <p:sldIdLst>
     <p:sldId id="256" r:id="rId2"/>
     <p:sldId id="257" r:id="rId3"/>
-    <p:sldId id="263" r:id="rId4"/>
-    <p:sldId id="258" r:id="rId5"/>
-    <p:sldId id="259" r:id="rId6"/>
-    <p:sldId id="260" r:id="rId7"/>
-    <p:sldId id="264" r:id="rId8"/>
-    <p:sldId id="267" r:id="rId9"/>
-    <p:sldId id="265" r:id="rId10"/>
-    <p:sldId id="261" r:id="rId11"/>
-    <p:sldId id="262" r:id="rId12"/>
-    <p:sldId id="266" r:id="rId13"/>
-    <p:sldId id="268" r:id="rId14"/>
-    <p:sldId id="269" r:id="rId15"/>
+    <p:sldId id="270" r:id="rId4"/>
+    <p:sldId id="271" r:id="rId5"/>
+    <p:sldId id="272" r:id="rId6"/>
+    <p:sldId id="273" r:id="rId7"/>
+    <p:sldId id="274" r:id="rId8"/>
+    <p:sldId id="277" r:id="rId9"/>
+    <p:sldId id="275" r:id="rId10"/>
+    <p:sldId id="278" r:id="rId11"/>
+    <p:sldId id="279" r:id="rId12"/>
+    <p:sldId id="280" r:id="rId13"/>
+    <p:sldId id="276" r:id="rId14"/>
   </p:sldIdLst>
-  <p:sldSz cx="9144000" cy="6858000" type="screen4x3"/>
+  <p:sldSz cx="12192000" cy="6858000"/>
   <p:notesSz cx="6858000" cy="9144000"/>
   <p:defaultTextStyle>
     <a:defPPr>
@@ -117,6 +116,22 @@
       </a:defRPr>
     </a:lvl9pPr>
   </p:defaultTextStyle>
+  <p:extLst>
+    <p:ext uri="{EFAFB233-063F-42B5-8137-9DF3F51BA10A}">
+      <p15:sldGuideLst xmlns:p15="http://schemas.microsoft.com/office/powerpoint/2012/main">
+        <p15:guide id="1" orient="horz" pos="2160" userDrawn="1">
+          <p15:clr>
+            <a:srgbClr val="A4A3A4"/>
+          </p15:clr>
+        </p15:guide>
+        <p15:guide id="2" pos="3840" userDrawn="1">
+          <p15:clr>
+            <a:srgbClr val="A4A3A4"/>
+          </p15:clr>
+        </p15:guide>
+      </p15:sldGuideLst>
+    </p:ext>
+  </p:extLst>
 </p:presentation>
 </file>
 
@@ -149,8 +164,8 @@
         </p:nvSpPr>
         <p:spPr>
           <a:xfrm>
-            <a:off x="685800" y="2130425"/>
-            <a:ext cx="7772400" cy="1470025"/>
+            <a:off x="914400" y="2130426"/>
+            <a:ext cx="10363200" cy="1470025"/>
           </a:xfrm>
         </p:spPr>
         <p:txBody>
@@ -177,8 +192,8 @@
         </p:nvSpPr>
         <p:spPr>
           <a:xfrm>
-            <a:off x="1371600" y="3886200"/>
-            <a:ext cx="6400800" cy="1752600"/>
+            <a:off x="1828800" y="3886200"/>
+            <a:ext cx="8534400" cy="1752600"/>
           </a:xfrm>
         </p:spPr>
         <p:txBody>
@@ -302,7 +317,7 @@
             <a:fld id="{C5437C51-8D48-4E53-BCED-A13F1A6B461A}" type="datetimeFigureOut">
               <a:rPr lang="pt-BR" smtClean="0"/>
               <a:pPr/>
-              <a:t>03/05/2015</a:t>
+              <a:t>26/06/2018</a:t>
             </a:fld>
             <a:endParaRPr lang="pt-BR"/>
           </a:p>
@@ -354,7 +369,7 @@
     </p:spTree>
     <p:extLst>
       <p:ext uri="{BB962C8B-B14F-4D97-AF65-F5344CB8AC3E}">
-        <p14:creationId xmlns="" xmlns:p14="http://schemas.microsoft.com/office/powerpoint/2010/main" val="2233006555"/>
+        <p14:creationId xmlns:p14="http://schemas.microsoft.com/office/powerpoint/2010/main" val="2233006555"/>
       </p:ext>
     </p:extLst>
   </p:cSld>
@@ -474,7 +489,7 @@
             <a:fld id="{C5437C51-8D48-4E53-BCED-A13F1A6B461A}" type="datetimeFigureOut">
               <a:rPr lang="pt-BR" smtClean="0"/>
               <a:pPr/>
-              <a:t>03/05/2015</a:t>
+              <a:t>26/06/2018</a:t>
             </a:fld>
             <a:endParaRPr lang="pt-BR"/>
           </a:p>
@@ -526,7 +541,7 @@
     </p:spTree>
     <p:extLst>
       <p:ext uri="{BB962C8B-B14F-4D97-AF65-F5344CB8AC3E}">
-        <p14:creationId xmlns="" xmlns:p14="http://schemas.microsoft.com/office/powerpoint/2010/main" val="3228436058"/>
+        <p14:creationId xmlns:p14="http://schemas.microsoft.com/office/powerpoint/2010/main" val="3228436058"/>
       </p:ext>
     </p:extLst>
   </p:cSld>
@@ -565,8 +580,8 @@
         </p:nvSpPr>
         <p:spPr>
           <a:xfrm>
-            <a:off x="6629400" y="274638"/>
-            <a:ext cx="2057400" cy="5851525"/>
+            <a:off x="8839200" y="274639"/>
+            <a:ext cx="2743200" cy="5851525"/>
           </a:xfrm>
         </p:spPr>
         <p:txBody>
@@ -593,8 +608,8 @@
         </p:nvSpPr>
         <p:spPr>
           <a:xfrm>
-            <a:off x="457200" y="274638"/>
-            <a:ext cx="6019800" cy="5851525"/>
+            <a:off x="609600" y="274639"/>
+            <a:ext cx="8026400" cy="5851525"/>
           </a:xfrm>
         </p:spPr>
         <p:txBody>
@@ -656,7 +671,7 @@
             <a:fld id="{C5437C51-8D48-4E53-BCED-A13F1A6B461A}" type="datetimeFigureOut">
               <a:rPr lang="pt-BR" smtClean="0"/>
               <a:pPr/>
-              <a:t>03/05/2015</a:t>
+              <a:t>26/06/2018</a:t>
             </a:fld>
             <a:endParaRPr lang="pt-BR"/>
           </a:p>
@@ -708,7 +723,7 @@
     </p:spTree>
     <p:extLst>
       <p:ext uri="{BB962C8B-B14F-4D97-AF65-F5344CB8AC3E}">
-        <p14:creationId xmlns="" xmlns:p14="http://schemas.microsoft.com/office/powerpoint/2010/main" val="3292110351"/>
+        <p14:creationId xmlns:p14="http://schemas.microsoft.com/office/powerpoint/2010/main" val="3292110351"/>
       </p:ext>
     </p:extLst>
   </p:cSld>
@@ -747,7 +762,7 @@
           <a:blip r:embed="rId2" cstate="print">
             <a:extLst>
               <a:ext uri="{28A0092B-C50C-407E-A947-70E740481C1C}">
-                <a14:useLocalDpi xmlns="" xmlns:a14="http://schemas.microsoft.com/office/drawing/2010/main" val="0"/>
+                <a14:useLocalDpi xmlns:a14="http://schemas.microsoft.com/office/drawing/2010/main" val="0"/>
               </a:ext>
             </a:extLst>
           </a:blip>
@@ -758,8 +773,8 @@
         </p:blipFill>
         <p:spPr bwMode="auto">
           <a:xfrm>
-            <a:off x="7092280" y="5607454"/>
-            <a:ext cx="2051720" cy="1250546"/>
+            <a:off x="10056440" y="5607454"/>
+            <a:ext cx="2135560" cy="1250546"/>
           </a:xfrm>
           <a:prstGeom prst="rect">
             <a:avLst/>
@@ -767,7 +782,7 @@
           <a:noFill/>
           <a:extLst>
             <a:ext uri="{909E8E84-426E-40DD-AFC4-6F175D3DCCD1}">
-              <a14:hiddenFill xmlns="" xmlns:a14="http://schemas.microsoft.com/office/drawing/2010/main">
+              <a14:hiddenFill xmlns:a14="http://schemas.microsoft.com/office/drawing/2010/main">
                 <a:solidFill>
                   <a:srgbClr val="FFFFFF"/>
                 </a:solidFill>
@@ -869,7 +884,7 @@
             <a:fld id="{C5437C51-8D48-4E53-BCED-A13F1A6B461A}" type="datetimeFigureOut">
               <a:rPr lang="pt-BR" smtClean="0"/>
               <a:pPr/>
-              <a:t>03/05/2015</a:t>
+              <a:t>26/06/2018</a:t>
             </a:fld>
             <a:endParaRPr lang="pt-BR"/>
           </a:p>
@@ -921,7 +936,7 @@
     </p:spTree>
     <p:extLst>
       <p:ext uri="{BB962C8B-B14F-4D97-AF65-F5344CB8AC3E}">
-        <p14:creationId xmlns="" xmlns:p14="http://schemas.microsoft.com/office/powerpoint/2010/main" val="3911074751"/>
+        <p14:creationId xmlns:p14="http://schemas.microsoft.com/office/powerpoint/2010/main" val="3911074751"/>
       </p:ext>
     </p:extLst>
   </p:cSld>
@@ -960,8 +975,8 @@
         </p:nvSpPr>
         <p:spPr>
           <a:xfrm>
-            <a:off x="722313" y="4406900"/>
-            <a:ext cx="7772400" cy="1362075"/>
+            <a:off x="963084" y="4406901"/>
+            <a:ext cx="10363200" cy="1362075"/>
           </a:xfrm>
         </p:spPr>
         <p:txBody>
@@ -992,8 +1007,8 @@
         </p:nvSpPr>
         <p:spPr>
           <a:xfrm>
-            <a:off x="722313" y="2906713"/>
-            <a:ext cx="7772400" cy="1500187"/>
+            <a:off x="963084" y="2906713"/>
+            <a:ext cx="10363200" cy="1500187"/>
           </a:xfrm>
         </p:spPr>
         <p:txBody>
@@ -1117,7 +1132,7 @@
             <a:fld id="{C5437C51-8D48-4E53-BCED-A13F1A6B461A}" type="datetimeFigureOut">
               <a:rPr lang="pt-BR" smtClean="0"/>
               <a:pPr/>
-              <a:t>03/05/2015</a:t>
+              <a:t>26/06/2018</a:t>
             </a:fld>
             <a:endParaRPr lang="pt-BR"/>
           </a:p>
@@ -1169,7 +1184,7 @@
     </p:spTree>
     <p:extLst>
       <p:ext uri="{BB962C8B-B14F-4D97-AF65-F5344CB8AC3E}">
-        <p14:creationId xmlns="" xmlns:p14="http://schemas.microsoft.com/office/powerpoint/2010/main" val="4043032807"/>
+        <p14:creationId xmlns:p14="http://schemas.microsoft.com/office/powerpoint/2010/main" val="4043032807"/>
       </p:ext>
     </p:extLst>
   </p:cSld>
@@ -1231,8 +1246,8 @@
         </p:nvSpPr>
         <p:spPr>
           <a:xfrm>
-            <a:off x="457200" y="1600200"/>
-            <a:ext cx="4038600" cy="4525963"/>
+            <a:off x="609600" y="1600201"/>
+            <a:ext cx="5384800" cy="4525963"/>
           </a:xfrm>
         </p:spPr>
         <p:txBody>
@@ -1316,8 +1331,8 @@
         </p:nvSpPr>
         <p:spPr>
           <a:xfrm>
-            <a:off x="4648200" y="1600200"/>
-            <a:ext cx="4038600" cy="4525963"/>
+            <a:off x="6197600" y="1600201"/>
+            <a:ext cx="5384800" cy="4525963"/>
           </a:xfrm>
         </p:spPr>
         <p:txBody>
@@ -1407,7 +1422,7 @@
             <a:fld id="{C5437C51-8D48-4E53-BCED-A13F1A6B461A}" type="datetimeFigureOut">
               <a:rPr lang="pt-BR" smtClean="0"/>
               <a:pPr/>
-              <a:t>03/05/2015</a:t>
+              <a:t>26/06/2018</a:t>
             </a:fld>
             <a:endParaRPr lang="pt-BR"/>
           </a:p>
@@ -1459,7 +1474,7 @@
     </p:spTree>
     <p:extLst>
       <p:ext uri="{BB962C8B-B14F-4D97-AF65-F5344CB8AC3E}">
-        <p14:creationId xmlns="" xmlns:p14="http://schemas.microsoft.com/office/powerpoint/2010/main" val="832408555"/>
+        <p14:creationId xmlns:p14="http://schemas.microsoft.com/office/powerpoint/2010/main" val="832408555"/>
       </p:ext>
     </p:extLst>
   </p:cSld>
@@ -1525,8 +1540,8 @@
         </p:nvSpPr>
         <p:spPr>
           <a:xfrm>
-            <a:off x="457200" y="1535113"/>
-            <a:ext cx="4040188" cy="639762"/>
+            <a:off x="609600" y="1535113"/>
+            <a:ext cx="5386917" cy="639762"/>
           </a:xfrm>
         </p:spPr>
         <p:txBody>
@@ -1590,8 +1605,8 @@
         </p:nvSpPr>
         <p:spPr>
           <a:xfrm>
-            <a:off x="457200" y="2174875"/>
-            <a:ext cx="4040188" cy="3951288"/>
+            <a:off x="609600" y="2174875"/>
+            <a:ext cx="5386917" cy="3951288"/>
           </a:xfrm>
         </p:spPr>
         <p:txBody>
@@ -1675,8 +1690,8 @@
         </p:nvSpPr>
         <p:spPr>
           <a:xfrm>
-            <a:off x="4645025" y="1535113"/>
-            <a:ext cx="4041775" cy="639762"/>
+            <a:off x="6193368" y="1535113"/>
+            <a:ext cx="5389033" cy="639762"/>
           </a:xfrm>
         </p:spPr>
         <p:txBody>
@@ -1740,8 +1755,8 @@
         </p:nvSpPr>
         <p:spPr>
           <a:xfrm>
-            <a:off x="4645025" y="2174875"/>
-            <a:ext cx="4041775" cy="3951288"/>
+            <a:off x="6193368" y="2174875"/>
+            <a:ext cx="5389033" cy="3951288"/>
           </a:xfrm>
         </p:spPr>
         <p:txBody>
@@ -1831,7 +1846,7 @@
             <a:fld id="{C5437C51-8D48-4E53-BCED-A13F1A6B461A}" type="datetimeFigureOut">
               <a:rPr lang="pt-BR" smtClean="0"/>
               <a:pPr/>
-              <a:t>03/05/2015</a:t>
+              <a:t>26/06/2018</a:t>
             </a:fld>
             <a:endParaRPr lang="pt-BR"/>
           </a:p>
@@ -1883,7 +1898,7 @@
     </p:spTree>
     <p:extLst>
       <p:ext uri="{BB962C8B-B14F-4D97-AF65-F5344CB8AC3E}">
-        <p14:creationId xmlns="" xmlns:p14="http://schemas.microsoft.com/office/powerpoint/2010/main" val="3122915151"/>
+        <p14:creationId xmlns:p14="http://schemas.microsoft.com/office/powerpoint/2010/main" val="3122915151"/>
       </p:ext>
     </p:extLst>
   </p:cSld>
@@ -1951,7 +1966,7 @@
             <a:fld id="{C5437C51-8D48-4E53-BCED-A13F1A6B461A}" type="datetimeFigureOut">
               <a:rPr lang="pt-BR" smtClean="0"/>
               <a:pPr/>
-              <a:t>03/05/2015</a:t>
+              <a:t>26/06/2018</a:t>
             </a:fld>
             <a:endParaRPr lang="pt-BR"/>
           </a:p>
@@ -2003,7 +2018,7 @@
     </p:spTree>
     <p:extLst>
       <p:ext uri="{BB962C8B-B14F-4D97-AF65-F5344CB8AC3E}">
-        <p14:creationId xmlns="" xmlns:p14="http://schemas.microsoft.com/office/powerpoint/2010/main" val="4020658352"/>
+        <p14:creationId xmlns:p14="http://schemas.microsoft.com/office/powerpoint/2010/main" val="4020658352"/>
       </p:ext>
     </p:extLst>
   </p:cSld>
@@ -2048,7 +2063,7 @@
             <a:fld id="{C5437C51-8D48-4E53-BCED-A13F1A6B461A}" type="datetimeFigureOut">
               <a:rPr lang="pt-BR" smtClean="0"/>
               <a:pPr/>
-              <a:t>03/05/2015</a:t>
+              <a:t>26/06/2018</a:t>
             </a:fld>
             <a:endParaRPr lang="pt-BR"/>
           </a:p>
@@ -2100,7 +2115,7 @@
     </p:spTree>
     <p:extLst>
       <p:ext uri="{BB962C8B-B14F-4D97-AF65-F5344CB8AC3E}">
-        <p14:creationId xmlns="" xmlns:p14="http://schemas.microsoft.com/office/powerpoint/2010/main" val="27897540"/>
+        <p14:creationId xmlns:p14="http://schemas.microsoft.com/office/powerpoint/2010/main" val="27897540"/>
       </p:ext>
     </p:extLst>
   </p:cSld>
@@ -2139,8 +2154,8 @@
         </p:nvSpPr>
         <p:spPr>
           <a:xfrm>
-            <a:off x="457200" y="273050"/>
-            <a:ext cx="3008313" cy="1162050"/>
+            <a:off x="609601" y="273050"/>
+            <a:ext cx="4011084" cy="1162050"/>
           </a:xfrm>
         </p:spPr>
         <p:txBody>
@@ -2171,8 +2186,8 @@
         </p:nvSpPr>
         <p:spPr>
           <a:xfrm>
-            <a:off x="3575050" y="273050"/>
-            <a:ext cx="5111750" cy="5853113"/>
+            <a:off x="4766733" y="273051"/>
+            <a:ext cx="6815667" cy="5853113"/>
           </a:xfrm>
         </p:spPr>
         <p:txBody>
@@ -2256,8 +2271,8 @@
         </p:nvSpPr>
         <p:spPr>
           <a:xfrm>
-            <a:off x="457200" y="1435100"/>
-            <a:ext cx="3008313" cy="4691063"/>
+            <a:off x="609601" y="1435101"/>
+            <a:ext cx="4011084" cy="4691063"/>
           </a:xfrm>
         </p:spPr>
         <p:txBody>
@@ -2327,7 +2342,7 @@
             <a:fld id="{C5437C51-8D48-4E53-BCED-A13F1A6B461A}" type="datetimeFigureOut">
               <a:rPr lang="pt-BR" smtClean="0"/>
               <a:pPr/>
-              <a:t>03/05/2015</a:t>
+              <a:t>26/06/2018</a:t>
             </a:fld>
             <a:endParaRPr lang="pt-BR"/>
           </a:p>
@@ -2379,7 +2394,7 @@
     </p:spTree>
     <p:extLst>
       <p:ext uri="{BB962C8B-B14F-4D97-AF65-F5344CB8AC3E}">
-        <p14:creationId xmlns="" xmlns:p14="http://schemas.microsoft.com/office/powerpoint/2010/main" val="2386914269"/>
+        <p14:creationId xmlns:p14="http://schemas.microsoft.com/office/powerpoint/2010/main" val="2386914269"/>
       </p:ext>
     </p:extLst>
   </p:cSld>
@@ -2418,8 +2433,8 @@
         </p:nvSpPr>
         <p:spPr>
           <a:xfrm>
-            <a:off x="1792288" y="4800600"/>
-            <a:ext cx="5486400" cy="566738"/>
+            <a:off x="2389717" y="4800600"/>
+            <a:ext cx="7315200" cy="566738"/>
           </a:xfrm>
         </p:spPr>
         <p:txBody>
@@ -2450,8 +2465,8 @@
         </p:nvSpPr>
         <p:spPr>
           <a:xfrm>
-            <a:off x="1792288" y="612775"/>
-            <a:ext cx="5486400" cy="4114800"/>
+            <a:off x="2389717" y="612775"/>
+            <a:ext cx="7315200" cy="4114800"/>
           </a:xfrm>
         </p:spPr>
         <p:txBody>
@@ -2511,8 +2526,8 @@
         </p:nvSpPr>
         <p:spPr>
           <a:xfrm>
-            <a:off x="1792288" y="5367338"/>
-            <a:ext cx="5486400" cy="804862"/>
+            <a:off x="2389717" y="5367338"/>
+            <a:ext cx="7315200" cy="804862"/>
           </a:xfrm>
         </p:spPr>
         <p:txBody>
@@ -2582,7 +2597,7 @@
             <a:fld id="{C5437C51-8D48-4E53-BCED-A13F1A6B461A}" type="datetimeFigureOut">
               <a:rPr lang="pt-BR" smtClean="0"/>
               <a:pPr/>
-              <a:t>03/05/2015</a:t>
+              <a:t>26/06/2018</a:t>
             </a:fld>
             <a:endParaRPr lang="pt-BR"/>
           </a:p>
@@ -2634,7 +2649,7 @@
     </p:spTree>
     <p:extLst>
       <p:ext uri="{BB962C8B-B14F-4D97-AF65-F5344CB8AC3E}">
-        <p14:creationId xmlns="" xmlns:p14="http://schemas.microsoft.com/office/powerpoint/2010/main" val="707082778"/>
+        <p14:creationId xmlns:p14="http://schemas.microsoft.com/office/powerpoint/2010/main" val="707082778"/>
       </p:ext>
     </p:extLst>
   </p:cSld>
@@ -2678,8 +2693,8 @@
         </p:nvSpPr>
         <p:spPr>
           <a:xfrm>
-            <a:off x="457200" y="274638"/>
-            <a:ext cx="8229600" cy="1143000"/>
+            <a:off x="609600" y="274638"/>
+            <a:ext cx="10972800" cy="1143000"/>
           </a:xfrm>
           <a:prstGeom prst="rect">
             <a:avLst/>
@@ -2711,8 +2726,8 @@
         </p:nvSpPr>
         <p:spPr>
           <a:xfrm>
-            <a:off x="457200" y="1600200"/>
-            <a:ext cx="8229600" cy="4525963"/>
+            <a:off x="609600" y="1600201"/>
+            <a:ext cx="10972800" cy="4525963"/>
           </a:xfrm>
           <a:prstGeom prst="rect">
             <a:avLst/>
@@ -2773,8 +2788,8 @@
         </p:nvSpPr>
         <p:spPr>
           <a:xfrm>
-            <a:off x="457200" y="6356350"/>
-            <a:ext cx="2133600" cy="365125"/>
+            <a:off x="609600" y="6356351"/>
+            <a:ext cx="2844800" cy="365125"/>
           </a:xfrm>
           <a:prstGeom prst="rect">
             <a:avLst/>
@@ -2797,7 +2812,7 @@
             <a:fld id="{C5437C51-8D48-4E53-BCED-A13F1A6B461A}" type="datetimeFigureOut">
               <a:rPr lang="pt-BR" smtClean="0"/>
               <a:pPr/>
-              <a:t>03/05/2015</a:t>
+              <a:t>26/06/2018</a:t>
             </a:fld>
             <a:endParaRPr lang="pt-BR"/>
           </a:p>
@@ -2815,8 +2830,8 @@
         </p:nvSpPr>
         <p:spPr>
           <a:xfrm>
-            <a:off x="3124200" y="6356350"/>
-            <a:ext cx="2895600" cy="365125"/>
+            <a:off x="4165600" y="6356351"/>
+            <a:ext cx="3860800" cy="365125"/>
           </a:xfrm>
           <a:prstGeom prst="rect">
             <a:avLst/>
@@ -2852,8 +2867,8 @@
         </p:nvSpPr>
         <p:spPr>
           <a:xfrm>
-            <a:off x="6553200" y="6356350"/>
-            <a:ext cx="2133600" cy="365125"/>
+            <a:off x="8737600" y="6356351"/>
+            <a:ext cx="2844800" cy="365125"/>
           </a:xfrm>
           <a:prstGeom prst="rect">
             <a:avLst/>
@@ -2885,7 +2900,7 @@
     </p:spTree>
     <p:extLst>
       <p:ext uri="{BB962C8B-B14F-4D97-AF65-F5344CB8AC3E}">
-        <p14:creationId xmlns="" xmlns:p14="http://schemas.microsoft.com/office/powerpoint/2010/main" val="3080603253"/>
+        <p14:creationId xmlns:p14="http://schemas.microsoft.com/office/powerpoint/2010/main" val="3080603253"/>
       </p:ext>
     </p:extLst>
   </p:cSld>
@@ -3191,15 +3206,26 @@
             <a:pPr fontAlgn="base"/>
             <a:r>
               <a:rPr lang="pt-BR" dirty="0" smtClean="0"/>
-              <a:t>Trabalhando com Broadcast </a:t>
+              <a:t>Trabalhando com </a:t>
             </a:r>
             <a:r>
               <a:rPr lang="pt-BR" dirty="0" err="1" smtClean="0"/>
-              <a:t>Receivers</a:t>
+              <a:t>services</a:t>
             </a:r>
             <a:r>
               <a:rPr lang="pt-BR" dirty="0" smtClean="0"/>
-              <a:t> no </a:t>
+              <a:t/>
+            </a:r>
+            <a:br>
+              <a:rPr lang="pt-BR" dirty="0" smtClean="0"/>
+            </a:br>
+            <a:r>
+              <a:rPr lang="pt-BR" dirty="0" smtClean="0"/>
+              <a:t> </a:t>
+            </a:r>
+            <a:r>
+              <a:rPr lang="pt-BR" dirty="0" smtClean="0"/>
+              <a:t>no </a:t>
             </a:r>
             <a:r>
               <a:rPr lang="pt-BR" dirty="0" err="1" smtClean="0"/>
@@ -3235,7 +3261,7 @@
     </p:spTree>
     <p:extLst>
       <p:ext uri="{BB962C8B-B14F-4D97-AF65-F5344CB8AC3E}">
-        <p14:creationId xmlns="" xmlns:p14="http://schemas.microsoft.com/office/powerpoint/2010/main" val="637232929"/>
+        <p14:creationId xmlns:p14="http://schemas.microsoft.com/office/powerpoint/2010/main" val="637232929"/>
       </p:ext>
     </p:extLst>
   </p:cSld>
@@ -3286,7 +3312,7 @@
           <a:p>
             <a:r>
               <a:rPr lang="pt-BR" dirty="0" smtClean="0"/>
-              <a:t>Segundo plano</a:t>
+              <a:t>Service</a:t>
             </a:r>
             <a:endParaRPr lang="pt-BR" dirty="0"/>
           </a:p>
@@ -3309,46 +3335,149 @@
           </a:bodyPr>
           <a:lstStyle/>
           <a:p>
-            <a:pPr fontAlgn="base"/>
-            <a:r>
-              <a:rPr lang="pt-BR" dirty="0" smtClean="0"/>
-              <a:t>O Broadcast </a:t>
-            </a:r>
-            <a:r>
-              <a:rPr lang="pt-BR" dirty="0" err="1" smtClean="0"/>
-              <a:t>Receiver</a:t>
-            </a:r>
-            <a:r>
-              <a:rPr lang="pt-BR" dirty="0" smtClean="0"/>
-              <a:t> é um componente do </a:t>
-            </a:r>
-            <a:r>
-              <a:rPr lang="pt-BR" dirty="0" err="1" smtClean="0"/>
-              <a:t>Android</a:t>
-            </a:r>
-            <a:r>
-              <a:rPr lang="pt-BR" dirty="0" smtClean="0"/>
-              <a:t> que executa em segundo plano, não depende de uma interface gráfica e não interage com o usuário.</a:t>
-            </a:r>
-          </a:p>
-          <a:p>
+            <a:pPr marL="0" indent="0">
+              <a:buNone/>
+            </a:pPr>
+            <a:r>
+              <a:rPr lang="pt-BR" dirty="0" err="1">
+                <a:hlinkClick r:id="rId2"/>
+              </a:rPr>
+              <a:t>onStartCommand</a:t>
+            </a:r>
+            <a:r>
+              <a:rPr lang="pt-BR" dirty="0" smtClean="0">
+                <a:hlinkClick r:id="rId2"/>
+              </a:rPr>
+              <a:t>()</a:t>
+            </a:r>
             <a:endParaRPr lang="pt-BR" dirty="0" smtClean="0"/>
           </a:p>
           <a:p>
-            <a:endParaRPr lang="pt-BR" dirty="0"/>
+            <a:pPr marL="0" indent="0">
+              <a:buNone/>
+            </a:pPr>
+            <a:r>
+              <a:rPr lang="pt-BR" dirty="0"/>
+              <a:t>O sistema chama esse método quando outro componente, como uma atividade, solicita que o serviço seja iniciado, chamando </a:t>
+            </a:r>
+            <a:r>
+              <a:rPr lang="pt-BR" b="1" dirty="0" err="1"/>
+              <a:t>startService</a:t>
+            </a:r>
+            <a:r>
+              <a:rPr lang="pt-BR" b="1" dirty="0"/>
+              <a:t>()</a:t>
+            </a:r>
+          </a:p>
+        </p:txBody>
+      </p:sp>
+      <p:sp>
+        <p:nvSpPr>
+          <p:cNvPr id="7170" name="AutoShape 2" descr="http://upload.wikimedia.org/wikipedia/commons/d/dc/Broadcast.svg"/>
+          <p:cNvSpPr>
+            <a:spLocks noChangeAspect="1" noChangeArrowheads="1"/>
+          </p:cNvSpPr>
+          <p:nvPr/>
+        </p:nvSpPr>
+        <p:spPr bwMode="auto">
+          <a:xfrm>
+            <a:off x="1679575" y="-144463"/>
+            <a:ext cx="304800" cy="304801"/>
+          </a:xfrm>
+          <a:prstGeom prst="rect">
+            <a:avLst/>
+          </a:prstGeom>
+          <a:noFill/>
+        </p:spPr>
+        <p:txBody>
+          <a:bodyPr vert="horz" wrap="square" lIns="91440" tIns="45720" rIns="91440" bIns="45720" numCol="1" anchor="t" anchorCtr="0" compatLnSpc="1">
+            <a:prstTxWarp prst="textNoShape">
+              <a:avLst/>
+            </a:prstTxWarp>
+          </a:bodyPr>
+          <a:lstStyle/>
+          <a:p>
+            <a:endParaRPr lang="pt-BR"/>
+          </a:p>
+        </p:txBody>
+      </p:sp>
+      <p:sp>
+        <p:nvSpPr>
+          <p:cNvPr id="7172" name="AutoShape 4" descr="http://upload.wikimedia.org/wikipedia/commons/d/dc/Broadcast.svg"/>
+          <p:cNvSpPr>
+            <a:spLocks noChangeAspect="1" noChangeArrowheads="1"/>
+          </p:cNvSpPr>
+          <p:nvPr/>
+        </p:nvSpPr>
+        <p:spPr bwMode="auto">
+          <a:xfrm>
+            <a:off x="1679575" y="-144463"/>
+            <a:ext cx="304800" cy="304801"/>
+          </a:xfrm>
+          <a:prstGeom prst="rect">
+            <a:avLst/>
+          </a:prstGeom>
+          <a:noFill/>
+        </p:spPr>
+        <p:txBody>
+          <a:bodyPr vert="horz" wrap="square" lIns="91440" tIns="45720" rIns="91440" bIns="45720" numCol="1" anchor="t" anchorCtr="0" compatLnSpc="1">
+            <a:prstTxWarp prst="textNoShape">
+              <a:avLst/>
+            </a:prstTxWarp>
+          </a:bodyPr>
+          <a:lstStyle/>
+          <a:p>
+            <a:endParaRPr lang="pt-BR"/>
+          </a:p>
+        </p:txBody>
+      </p:sp>
+      <p:sp>
+        <p:nvSpPr>
+          <p:cNvPr id="7174" name="AutoShape 6" descr="http://upload.wikimedia.org/wikipedia/commons/d/dc/Broadcast.svg"/>
+          <p:cNvSpPr>
+            <a:spLocks noChangeAspect="1" noChangeArrowheads="1"/>
+          </p:cNvSpPr>
+          <p:nvPr/>
+        </p:nvSpPr>
+        <p:spPr bwMode="auto">
+          <a:xfrm>
+            <a:off x="1679575" y="-144463"/>
+            <a:ext cx="304800" cy="304801"/>
+          </a:xfrm>
+          <a:prstGeom prst="rect">
+            <a:avLst/>
+          </a:prstGeom>
+          <a:noFill/>
+        </p:spPr>
+        <p:txBody>
+          <a:bodyPr vert="horz" wrap="square" lIns="91440" tIns="45720" rIns="91440" bIns="45720" numCol="1" anchor="t" anchorCtr="0" compatLnSpc="1">
+            <a:prstTxWarp prst="textNoShape">
+              <a:avLst/>
+            </a:prstTxWarp>
+          </a:bodyPr>
+          <a:lstStyle/>
+          <a:p>
+            <a:endParaRPr lang="pt-BR"/>
           </a:p>
         </p:txBody>
       </p:sp>
     </p:spTree>
     <p:extLst>
       <p:ext uri="{BB962C8B-B14F-4D97-AF65-F5344CB8AC3E}">
-        <p14:creationId xmlns="" xmlns:p14="http://schemas.microsoft.com/office/powerpoint/2010/main" val="1131850590"/>
+        <p14:creationId xmlns:p14="http://schemas.microsoft.com/office/powerpoint/2010/main" val="3973527947"/>
       </p:ext>
     </p:extLst>
   </p:cSld>
   <p:clrMapOvr>
     <a:masterClrMapping/>
   </p:clrMapOvr>
+  <p:timing>
+    <p:tnLst>
+      <p:par>
+        <p:cTn id="1" dur="indefinite" restart="never" nodeType="tmRoot"/>
+      </p:par>
+    </p:tnLst>
+  </p:timing>
 </p:sld>
 </file>
 
@@ -3384,62 +3513,209 @@
           <a:bodyPr/>
           <a:lstStyle/>
           <a:p>
-            <a:pPr fontAlgn="base"/>
-            <a:r>
-              <a:rPr lang="pt-BR" b="1" dirty="0" smtClean="0"/>
-              <a:t>Criando um Broadcast </a:t>
-            </a:r>
-            <a:r>
-              <a:rPr lang="pt-BR" b="1" dirty="0" err="1" smtClean="0"/>
-              <a:t>Receiver</a:t>
+            <a:r>
+              <a:rPr lang="pt-BR" dirty="0" smtClean="0"/>
+              <a:t>Service</a:t>
+            </a:r>
+            <a:endParaRPr lang="pt-BR" dirty="0"/>
+          </a:p>
+        </p:txBody>
+      </p:sp>
+      <p:sp>
+        <p:nvSpPr>
+          <p:cNvPr id="3" name="Content Placeholder 2"/>
+          <p:cNvSpPr>
+            <a:spLocks noGrp="1"/>
+          </p:cNvSpPr>
+          <p:nvPr>
+            <p:ph idx="1"/>
+          </p:nvPr>
+        </p:nvSpPr>
+        <p:spPr/>
+        <p:txBody>
+          <a:bodyPr>
+            <a:normAutofit/>
+          </a:bodyPr>
+          <a:lstStyle/>
+          <a:p>
+            <a:pPr marL="0" indent="0">
+              <a:buNone/>
+            </a:pPr>
+            <a:r>
+              <a:rPr lang="pt-BR" dirty="0" err="1">
+                <a:hlinkClick r:id="rId2"/>
+              </a:rPr>
+              <a:t>onStartCommand</a:t>
+            </a:r>
+            <a:r>
+              <a:rPr lang="pt-BR" dirty="0" smtClean="0">
+                <a:hlinkClick r:id="rId2"/>
+              </a:rPr>
+              <a:t>()</a:t>
+            </a:r>
+            <a:endParaRPr lang="pt-BR" dirty="0" smtClean="0"/>
+          </a:p>
+          <a:p>
+            <a:pPr marL="0" indent="0">
+              <a:buNone/>
+            </a:pPr>
+            <a:r>
+              <a:rPr lang="pt-BR" dirty="0" smtClean="0"/>
+              <a:t>Quando </a:t>
+            </a:r>
+            <a:r>
+              <a:rPr lang="pt-BR" dirty="0"/>
+              <a:t>esse método é executado, o serviço é iniciado e pode ser executado em segundo plano indefinidamente. </a:t>
+            </a:r>
+            <a:endParaRPr lang="pt-BR" dirty="0" smtClean="0"/>
+          </a:p>
+          <a:p>
+            <a:pPr marL="0" indent="0">
+              <a:buNone/>
+            </a:pPr>
+            <a:r>
+              <a:rPr lang="pt-BR" dirty="0" smtClean="0"/>
+              <a:t>Se </a:t>
+            </a:r>
+            <a:r>
+              <a:rPr lang="pt-BR" dirty="0" err="1" smtClean="0"/>
+              <a:t>vc</a:t>
+            </a:r>
+            <a:r>
+              <a:rPr lang="pt-BR" dirty="0" smtClean="0"/>
+              <a:t> implementar </a:t>
+            </a:r>
+            <a:r>
+              <a:rPr lang="pt-BR" dirty="0"/>
+              <a:t>isso, é de sua responsabilidade interromper o serviço quando o trabalho for concluído, chamando </a:t>
+            </a:r>
+            <a:r>
+              <a:rPr lang="pt-BR" dirty="0" err="1"/>
+              <a:t>stopSelf</a:t>
+            </a:r>
+            <a:r>
+              <a:rPr lang="pt-BR" dirty="0"/>
+              <a:t>() ou </a:t>
+            </a:r>
+            <a:r>
+              <a:rPr lang="pt-BR" dirty="0" err="1"/>
+              <a:t>stopService</a:t>
+            </a:r>
+            <a:r>
+              <a:rPr lang="pt-BR" dirty="0"/>
+              <a:t>(). </a:t>
             </a:r>
             <a:endParaRPr lang="pt-BR" b="1" dirty="0"/>
           </a:p>
         </p:txBody>
       </p:sp>
-      <p:pic>
-        <p:nvPicPr>
-          <p:cNvPr id="2049" name="Picture 1"/>
-          <p:cNvPicPr>
-            <a:picLocks noChangeAspect="1" noChangeArrowheads="1"/>
-          </p:cNvPicPr>
+      <p:sp>
+        <p:nvSpPr>
+          <p:cNvPr id="7170" name="AutoShape 2" descr="http://upload.wikimedia.org/wikipedia/commons/d/dc/Broadcast.svg"/>
+          <p:cNvSpPr>
+            <a:spLocks noChangeAspect="1" noChangeArrowheads="1"/>
+          </p:cNvSpPr>
           <p:nvPr/>
-        </p:nvPicPr>
-        <p:blipFill>
-          <a:blip r:embed="rId2"/>
-          <a:srcRect/>
-          <a:stretch>
-            <a:fillRect/>
-          </a:stretch>
-        </p:blipFill>
+        </p:nvSpPr>
         <p:spPr bwMode="auto">
           <a:xfrm>
-            <a:off x="500034" y="1928802"/>
-            <a:ext cx="8460299" cy="2143140"/>
+            <a:off x="1679575" y="-144463"/>
+            <a:ext cx="304800" cy="304801"/>
           </a:xfrm>
           <a:prstGeom prst="rect">
             <a:avLst/>
           </a:prstGeom>
           <a:noFill/>
-          <a:ln w="9525">
-            <a:noFill/>
-            <a:miter lim="800000"/>
-            <a:headEnd/>
-            <a:tailEnd/>
-          </a:ln>
-          <a:effectLst/>
         </p:spPr>
-      </p:pic>
+        <p:txBody>
+          <a:bodyPr vert="horz" wrap="square" lIns="91440" tIns="45720" rIns="91440" bIns="45720" numCol="1" anchor="t" anchorCtr="0" compatLnSpc="1">
+            <a:prstTxWarp prst="textNoShape">
+              <a:avLst/>
+            </a:prstTxWarp>
+          </a:bodyPr>
+          <a:lstStyle/>
+          <a:p>
+            <a:endParaRPr lang="pt-BR"/>
+          </a:p>
+        </p:txBody>
+      </p:sp>
+      <p:sp>
+        <p:nvSpPr>
+          <p:cNvPr id="7172" name="AutoShape 4" descr="http://upload.wikimedia.org/wikipedia/commons/d/dc/Broadcast.svg"/>
+          <p:cNvSpPr>
+            <a:spLocks noChangeAspect="1" noChangeArrowheads="1"/>
+          </p:cNvSpPr>
+          <p:nvPr/>
+        </p:nvSpPr>
+        <p:spPr bwMode="auto">
+          <a:xfrm>
+            <a:off x="1679575" y="-144463"/>
+            <a:ext cx="304800" cy="304801"/>
+          </a:xfrm>
+          <a:prstGeom prst="rect">
+            <a:avLst/>
+          </a:prstGeom>
+          <a:noFill/>
+        </p:spPr>
+        <p:txBody>
+          <a:bodyPr vert="horz" wrap="square" lIns="91440" tIns="45720" rIns="91440" bIns="45720" numCol="1" anchor="t" anchorCtr="0" compatLnSpc="1">
+            <a:prstTxWarp prst="textNoShape">
+              <a:avLst/>
+            </a:prstTxWarp>
+          </a:bodyPr>
+          <a:lstStyle/>
+          <a:p>
+            <a:endParaRPr lang="pt-BR"/>
+          </a:p>
+        </p:txBody>
+      </p:sp>
+      <p:sp>
+        <p:nvSpPr>
+          <p:cNvPr id="7174" name="AutoShape 6" descr="http://upload.wikimedia.org/wikipedia/commons/d/dc/Broadcast.svg"/>
+          <p:cNvSpPr>
+            <a:spLocks noChangeAspect="1" noChangeArrowheads="1"/>
+          </p:cNvSpPr>
+          <p:nvPr/>
+        </p:nvSpPr>
+        <p:spPr bwMode="auto">
+          <a:xfrm>
+            <a:off x="1679575" y="-144463"/>
+            <a:ext cx="304800" cy="304801"/>
+          </a:xfrm>
+          <a:prstGeom prst="rect">
+            <a:avLst/>
+          </a:prstGeom>
+          <a:noFill/>
+        </p:spPr>
+        <p:txBody>
+          <a:bodyPr vert="horz" wrap="square" lIns="91440" tIns="45720" rIns="91440" bIns="45720" numCol="1" anchor="t" anchorCtr="0" compatLnSpc="1">
+            <a:prstTxWarp prst="textNoShape">
+              <a:avLst/>
+            </a:prstTxWarp>
+          </a:bodyPr>
+          <a:lstStyle/>
+          <a:p>
+            <a:endParaRPr lang="pt-BR"/>
+          </a:p>
+        </p:txBody>
+      </p:sp>
     </p:spTree>
     <p:extLst>
       <p:ext uri="{BB962C8B-B14F-4D97-AF65-F5344CB8AC3E}">
-        <p14:creationId xmlns="" xmlns:p14="http://schemas.microsoft.com/office/powerpoint/2010/main" val="1556171558"/>
+        <p14:creationId xmlns:p14="http://schemas.microsoft.com/office/powerpoint/2010/main" val="1426373968"/>
       </p:ext>
     </p:extLst>
   </p:cSld>
   <p:clrMapOvr>
     <a:masterClrMapping/>
   </p:clrMapOvr>
+  <p:timing>
+    <p:tnLst>
+      <p:par>
+        <p:cTn id="1" dur="indefinite" restart="never" nodeType="tmRoot"/>
+      </p:par>
+    </p:tnLst>
+  </p:timing>
 </p:sld>
 </file>
 
@@ -3472,21 +3748,14 @@
         </p:nvSpPr>
         <p:spPr/>
         <p:txBody>
-          <a:bodyPr>
-            <a:normAutofit fontScale="90000"/>
-          </a:bodyPr>
-          <a:lstStyle/>
-          <a:p>
-            <a:pPr fontAlgn="base"/>
-            <a:r>
-              <a:rPr lang="pt-BR" b="1" dirty="0" smtClean="0"/>
-              <a:t>Configurando um Broadcast </a:t>
-            </a:r>
-            <a:r>
-              <a:rPr lang="pt-BR" b="1" dirty="0" err="1" smtClean="0"/>
-              <a:t>Receiver</a:t>
-            </a:r>
-            <a:endParaRPr lang="pt-BR" b="1" dirty="0" smtClean="0"/>
+          <a:bodyPr/>
+          <a:lstStyle/>
+          <a:p>
+            <a:r>
+              <a:rPr lang="pt-BR" dirty="0" smtClean="0"/>
+              <a:t>Service</a:t>
+            </a:r>
+            <a:endParaRPr lang="pt-BR" dirty="0"/>
           </a:p>
         </p:txBody>
       </p:sp>
@@ -3507,86 +3776,141 @@
           </a:bodyPr>
           <a:lstStyle/>
           <a:p>
-            <a:pPr fontAlgn="base">
+            <a:pPr marL="0" indent="0">
               <a:buNone/>
             </a:pPr>
             <a:r>
-              <a:rPr lang="pt-BR" dirty="0" smtClean="0"/>
-              <a:t>Existem duas formas de configurar um Broadcast </a:t>
-            </a:r>
-            <a:r>
-              <a:rPr lang="pt-BR" dirty="0" err="1" smtClean="0"/>
-              <a:t>Receiver</a:t>
-            </a:r>
-            <a:r>
-              <a:rPr lang="pt-BR" dirty="0" smtClean="0"/>
-              <a:t> no </a:t>
-            </a:r>
-            <a:r>
-              <a:rPr lang="pt-BR" dirty="0" err="1" smtClean="0"/>
-              <a:t>Android</a:t>
-            </a:r>
-            <a:r>
-              <a:rPr lang="pt-BR" dirty="0" smtClean="0"/>
-              <a:t>:</a:t>
-            </a:r>
-          </a:p>
-          <a:p>
-            <a:pPr fontAlgn="base"/>
-            <a:r>
-              <a:rPr lang="pt-BR" b="1" dirty="0" smtClean="0"/>
-              <a:t>Estática</a:t>
-            </a:r>
-            <a:r>
-              <a:rPr lang="pt-BR" dirty="0" smtClean="0"/>
-              <a:t> (configurado no arquivo </a:t>
-            </a:r>
-            <a:r>
-              <a:rPr lang="pt-BR" i="1" dirty="0" err="1" smtClean="0"/>
-              <a:t>AndroidManifest</a:t>
-            </a:r>
-            <a:r>
-              <a:rPr lang="pt-BR" i="1" dirty="0" smtClean="0"/>
-              <a:t>.</a:t>
-            </a:r>
-            <a:r>
-              <a:rPr lang="pt-BR" i="1" dirty="0" err="1" smtClean="0"/>
-              <a:t>xml</a:t>
-            </a:r>
-            <a:r>
-              <a:rPr lang="pt-BR" dirty="0" smtClean="0"/>
-              <a:t>);</a:t>
-            </a:r>
-          </a:p>
-          <a:p>
-            <a:pPr fontAlgn="base"/>
-            <a:r>
-              <a:rPr lang="pt-BR" b="1" dirty="0" smtClean="0"/>
-              <a:t>Dinâmica</a:t>
-            </a:r>
-            <a:r>
-              <a:rPr lang="pt-BR" dirty="0" smtClean="0"/>
-              <a:t> (configurado no código de uma classe do aplicativo).</a:t>
-            </a:r>
-          </a:p>
-          <a:p>
+              <a:rPr lang="pt-BR" dirty="0" err="1">
+                <a:hlinkClick r:id="rId2"/>
+              </a:rPr>
+              <a:t>onDestroy</a:t>
+            </a:r>
+            <a:r>
+              <a:rPr lang="pt-BR" dirty="0" smtClean="0">
+                <a:hlinkClick r:id="rId2"/>
+              </a:rPr>
+              <a:t>()</a:t>
+            </a:r>
             <a:endParaRPr lang="pt-BR" dirty="0" smtClean="0"/>
           </a:p>
           <a:p>
-            <a:endParaRPr lang="pt-BR" dirty="0"/>
+            <a:pPr marL="0" indent="0">
+              <a:buNone/>
+            </a:pPr>
+            <a:r>
+              <a:rPr lang="pt-BR" dirty="0"/>
+              <a:t>O sistema chama esse método quando o serviço não é mais usado e está sendo destruído. O serviço deve implementar isso para limpar quaisquer recursos, como encadeamentos, escutas registradas, receptores etc. Essa é a última chamada que o serviço recebe.</a:t>
+            </a:r>
+          </a:p>
+        </p:txBody>
+      </p:sp>
+      <p:sp>
+        <p:nvSpPr>
+          <p:cNvPr id="7170" name="AutoShape 2" descr="http://upload.wikimedia.org/wikipedia/commons/d/dc/Broadcast.svg"/>
+          <p:cNvSpPr>
+            <a:spLocks noChangeAspect="1" noChangeArrowheads="1"/>
+          </p:cNvSpPr>
+          <p:nvPr/>
+        </p:nvSpPr>
+        <p:spPr bwMode="auto">
+          <a:xfrm>
+            <a:off x="1679575" y="-144463"/>
+            <a:ext cx="304800" cy="304801"/>
+          </a:xfrm>
+          <a:prstGeom prst="rect">
+            <a:avLst/>
+          </a:prstGeom>
+          <a:noFill/>
+        </p:spPr>
+        <p:txBody>
+          <a:bodyPr vert="horz" wrap="square" lIns="91440" tIns="45720" rIns="91440" bIns="45720" numCol="1" anchor="t" anchorCtr="0" compatLnSpc="1">
+            <a:prstTxWarp prst="textNoShape">
+              <a:avLst/>
+            </a:prstTxWarp>
+          </a:bodyPr>
+          <a:lstStyle/>
+          <a:p>
+            <a:endParaRPr lang="pt-BR"/>
+          </a:p>
+        </p:txBody>
+      </p:sp>
+      <p:sp>
+        <p:nvSpPr>
+          <p:cNvPr id="7172" name="AutoShape 4" descr="http://upload.wikimedia.org/wikipedia/commons/d/dc/Broadcast.svg"/>
+          <p:cNvSpPr>
+            <a:spLocks noChangeAspect="1" noChangeArrowheads="1"/>
+          </p:cNvSpPr>
+          <p:nvPr/>
+        </p:nvSpPr>
+        <p:spPr bwMode="auto">
+          <a:xfrm>
+            <a:off x="1679575" y="-144463"/>
+            <a:ext cx="304800" cy="304801"/>
+          </a:xfrm>
+          <a:prstGeom prst="rect">
+            <a:avLst/>
+          </a:prstGeom>
+          <a:noFill/>
+        </p:spPr>
+        <p:txBody>
+          <a:bodyPr vert="horz" wrap="square" lIns="91440" tIns="45720" rIns="91440" bIns="45720" numCol="1" anchor="t" anchorCtr="0" compatLnSpc="1">
+            <a:prstTxWarp prst="textNoShape">
+              <a:avLst/>
+            </a:prstTxWarp>
+          </a:bodyPr>
+          <a:lstStyle/>
+          <a:p>
+            <a:endParaRPr lang="pt-BR"/>
+          </a:p>
+        </p:txBody>
+      </p:sp>
+      <p:sp>
+        <p:nvSpPr>
+          <p:cNvPr id="7174" name="AutoShape 6" descr="http://upload.wikimedia.org/wikipedia/commons/d/dc/Broadcast.svg"/>
+          <p:cNvSpPr>
+            <a:spLocks noChangeAspect="1" noChangeArrowheads="1"/>
+          </p:cNvSpPr>
+          <p:nvPr/>
+        </p:nvSpPr>
+        <p:spPr bwMode="auto">
+          <a:xfrm>
+            <a:off x="1679575" y="-144463"/>
+            <a:ext cx="304800" cy="304801"/>
+          </a:xfrm>
+          <a:prstGeom prst="rect">
+            <a:avLst/>
+          </a:prstGeom>
+          <a:noFill/>
+        </p:spPr>
+        <p:txBody>
+          <a:bodyPr vert="horz" wrap="square" lIns="91440" tIns="45720" rIns="91440" bIns="45720" numCol="1" anchor="t" anchorCtr="0" compatLnSpc="1">
+            <a:prstTxWarp prst="textNoShape">
+              <a:avLst/>
+            </a:prstTxWarp>
+          </a:bodyPr>
+          <a:lstStyle/>
+          <a:p>
+            <a:endParaRPr lang="pt-BR"/>
           </a:p>
         </p:txBody>
       </p:sp>
     </p:spTree>
     <p:extLst>
       <p:ext uri="{BB962C8B-B14F-4D97-AF65-F5344CB8AC3E}">
-        <p14:creationId xmlns="" xmlns:p14="http://schemas.microsoft.com/office/powerpoint/2010/main" val="1131850590"/>
+        <p14:creationId xmlns:p14="http://schemas.microsoft.com/office/powerpoint/2010/main" val="2437625923"/>
       </p:ext>
     </p:extLst>
   </p:cSld>
   <p:clrMapOvr>
     <a:masterClrMapping/>
   </p:clrMapOvr>
+  <p:timing>
+    <p:tnLst>
+      <p:par>
+        <p:cTn id="1" dur="indefinite" restart="never" nodeType="tmRoot"/>
+      </p:par>
+    </p:tnLst>
+  </p:timing>
 </p:sld>
 </file>
 
@@ -3609,7 +3933,7 @@
       </p:grpSpPr>
       <p:sp>
         <p:nvSpPr>
-          <p:cNvPr id="2" name="Título 1"/>
+          <p:cNvPr id="2" name="Title 1"/>
           <p:cNvSpPr>
             <a:spLocks noGrp="1"/>
           </p:cNvSpPr>
@@ -3624,7 +3948,7 @@
           <a:p>
             <a:r>
               <a:rPr lang="pt-BR" dirty="0" smtClean="0"/>
-              <a:t>Broadcast Estático</a:t>
+              <a:t>Service</a:t>
             </a:r>
             <a:endParaRPr lang="pt-BR" dirty="0"/>
           </a:p>
@@ -3632,7 +3956,7 @@
       </p:sp>
       <p:sp>
         <p:nvSpPr>
-          <p:cNvPr id="3" name="Espaço Reservado para Conteúdo 2"/>
+          <p:cNvPr id="3" name="Content Placeholder 2"/>
           <p:cNvSpPr>
             <a:spLocks noGrp="1"/>
           </p:cNvSpPr>
@@ -3640,66 +3964,177 @@
             <p:ph idx="1"/>
           </p:nvPr>
         </p:nvSpPr>
-        <p:spPr>
+        <p:spPr/>
+        <p:txBody>
+          <a:bodyPr>
+            <a:normAutofit/>
+          </a:bodyPr>
+          <a:lstStyle/>
+          <a:p>
+            <a:pPr marL="0" indent="0">
+              <a:buNone/>
+            </a:pPr>
+            <a:r>
+              <a:rPr lang="pt-BR" dirty="0" smtClean="0"/>
+              <a:t>DECLARAÇÃO DE SERVIÇO NO MANIFESTO</a:t>
+            </a:r>
+          </a:p>
+          <a:p>
+            <a:r>
+              <a:rPr lang="pt-BR" dirty="0"/>
+              <a:t>Como atividades (e outros componentes), você deve declarar todos os serviços no arquivo de manifesto do aplicativo</a:t>
+            </a:r>
+            <a:r>
+              <a:rPr lang="pt-BR" dirty="0" smtClean="0"/>
+              <a:t>. </a:t>
+            </a:r>
+            <a:endParaRPr lang="pt-BR" dirty="0"/>
+          </a:p>
+          <a:p>
+            <a:r>
+              <a:rPr lang="pt-BR" dirty="0"/>
+              <a:t>Para declarar o serviço, adicione um elemento &lt;</a:t>
+            </a:r>
+            <a:r>
+              <a:rPr lang="pt-BR" dirty="0" err="1"/>
+              <a:t>service</a:t>
+            </a:r>
+            <a:r>
+              <a:rPr lang="pt-BR" dirty="0"/>
+              <a:t>&gt; como filho do elemento &lt;</a:t>
+            </a:r>
+            <a:r>
+              <a:rPr lang="pt-BR" dirty="0" err="1"/>
+              <a:t>application</a:t>
+            </a:r>
+            <a:r>
+              <a:rPr lang="pt-BR" dirty="0"/>
+              <a:t>&gt;</a:t>
+            </a:r>
+            <a:endParaRPr lang="pt-BR" dirty="0"/>
+          </a:p>
+        </p:txBody>
+      </p:sp>
+      <p:sp>
+        <p:nvSpPr>
+          <p:cNvPr id="7170" name="AutoShape 2" descr="http://upload.wikimedia.org/wikipedia/commons/d/dc/Broadcast.svg"/>
+          <p:cNvSpPr>
+            <a:spLocks noChangeAspect="1" noChangeArrowheads="1"/>
+          </p:cNvSpPr>
+          <p:nvPr/>
+        </p:nvSpPr>
+        <p:spPr bwMode="auto">
           <a:xfrm>
-            <a:off x="457200" y="1600201"/>
-            <a:ext cx="8229600" cy="1328734"/>
+            <a:off x="1679575" y="-144463"/>
+            <a:ext cx="304800" cy="304801"/>
           </a:xfrm>
+          <a:prstGeom prst="rect">
+            <a:avLst/>
+          </a:prstGeom>
+          <a:noFill/>
         </p:spPr>
         <p:txBody>
-          <a:bodyPr/>
-          <a:lstStyle/>
-          <a:p>
-            <a:r>
-              <a:rPr lang="pt-BR" dirty="0" smtClean="0"/>
-              <a:t>Criando uma classe para observar a inicialização do </a:t>
-            </a:r>
-            <a:r>
-              <a:rPr lang="pt-BR" dirty="0" err="1" smtClean="0"/>
-              <a:t>Android</a:t>
-            </a:r>
-            <a:r>
-              <a:rPr lang="pt-BR" dirty="0" smtClean="0"/>
-              <a:t>.</a:t>
-            </a:r>
-            <a:endParaRPr lang="pt-BR" dirty="0"/>
+          <a:bodyPr vert="horz" wrap="square" lIns="91440" tIns="45720" rIns="91440" bIns="45720" numCol="1" anchor="t" anchorCtr="0" compatLnSpc="1">
+            <a:prstTxWarp prst="textNoShape">
+              <a:avLst/>
+            </a:prstTxWarp>
+          </a:bodyPr>
+          <a:lstStyle/>
+          <a:p>
+            <a:endParaRPr lang="pt-BR"/>
+          </a:p>
+        </p:txBody>
+      </p:sp>
+      <p:sp>
+        <p:nvSpPr>
+          <p:cNvPr id="7172" name="AutoShape 4" descr="http://upload.wikimedia.org/wikipedia/commons/d/dc/Broadcast.svg"/>
+          <p:cNvSpPr>
+            <a:spLocks noChangeAspect="1" noChangeArrowheads="1"/>
+          </p:cNvSpPr>
+          <p:nvPr/>
+        </p:nvSpPr>
+        <p:spPr bwMode="auto">
+          <a:xfrm>
+            <a:off x="1679575" y="-144463"/>
+            <a:ext cx="304800" cy="304801"/>
+          </a:xfrm>
+          <a:prstGeom prst="rect">
+            <a:avLst/>
+          </a:prstGeom>
+          <a:noFill/>
+        </p:spPr>
+        <p:txBody>
+          <a:bodyPr vert="horz" wrap="square" lIns="91440" tIns="45720" rIns="91440" bIns="45720" numCol="1" anchor="t" anchorCtr="0" compatLnSpc="1">
+            <a:prstTxWarp prst="textNoShape">
+              <a:avLst/>
+            </a:prstTxWarp>
+          </a:bodyPr>
+          <a:lstStyle/>
+          <a:p>
+            <a:endParaRPr lang="pt-BR"/>
+          </a:p>
+        </p:txBody>
+      </p:sp>
+      <p:sp>
+        <p:nvSpPr>
+          <p:cNvPr id="7174" name="AutoShape 6" descr="http://upload.wikimedia.org/wikipedia/commons/d/dc/Broadcast.svg"/>
+          <p:cNvSpPr>
+            <a:spLocks noChangeAspect="1" noChangeArrowheads="1"/>
+          </p:cNvSpPr>
+          <p:nvPr/>
+        </p:nvSpPr>
+        <p:spPr bwMode="auto">
+          <a:xfrm>
+            <a:off x="1679575" y="-144463"/>
+            <a:ext cx="304800" cy="304801"/>
+          </a:xfrm>
+          <a:prstGeom prst="rect">
+            <a:avLst/>
+          </a:prstGeom>
+          <a:noFill/>
+        </p:spPr>
+        <p:txBody>
+          <a:bodyPr vert="horz" wrap="square" lIns="91440" tIns="45720" rIns="91440" bIns="45720" numCol="1" anchor="t" anchorCtr="0" compatLnSpc="1">
+            <a:prstTxWarp prst="textNoShape">
+              <a:avLst/>
+            </a:prstTxWarp>
+          </a:bodyPr>
+          <a:lstStyle/>
+          <a:p>
+            <a:endParaRPr lang="pt-BR"/>
           </a:p>
         </p:txBody>
       </p:sp>
       <p:pic>
         <p:nvPicPr>
-          <p:cNvPr id="1027" name="Picture 3"/>
+          <p:cNvPr id="5" name="Imagem 4"/>
           <p:cNvPicPr>
-            <a:picLocks noChangeAspect="1" noChangeArrowheads="1"/>
+            <a:picLocks noChangeAspect="1"/>
           </p:cNvPicPr>
           <p:nvPr/>
         </p:nvPicPr>
         <p:blipFill>
           <a:blip r:embed="rId2"/>
-          <a:srcRect/>
           <a:stretch>
             <a:fillRect/>
           </a:stretch>
         </p:blipFill>
-        <p:spPr bwMode="auto">
+        <p:spPr>
           <a:xfrm>
-            <a:off x="1" y="3035433"/>
-            <a:ext cx="9144000" cy="1922327"/>
+            <a:off x="911424" y="4581128"/>
+            <a:ext cx="8696325" cy="1943100"/>
           </a:xfrm>
           <a:prstGeom prst="rect">
             <a:avLst/>
           </a:prstGeom>
-          <a:noFill/>
-          <a:ln w="9525">
-            <a:noFill/>
-            <a:miter lim="800000"/>
-            <a:headEnd/>
-            <a:tailEnd/>
-          </a:ln>
-          <a:effectLst/>
         </p:spPr>
       </p:pic>
     </p:spTree>
+    <p:extLst>
+      <p:ext uri="{BB962C8B-B14F-4D97-AF65-F5344CB8AC3E}">
+        <p14:creationId xmlns:p14="http://schemas.microsoft.com/office/powerpoint/2010/main" val="364391201"/>
+      </p:ext>
+    </p:extLst>
   </p:cSld>
   <p:clrMapOvr>
     <a:masterClrMapping/>
@@ -3711,87 +4146,6 @@
       </p:par>
     </p:tnLst>
   </p:timing>
-</p:sld>
-</file>
-
-<file path=ppt/slides/slide14.xml><?xml version="1.0" encoding="utf-8"?>
-<p:sld xmlns:a="http://schemas.openxmlformats.org/drawingml/2006/main" xmlns:r="http://schemas.openxmlformats.org/officeDocument/2006/relationships" xmlns:p="http://schemas.openxmlformats.org/presentationml/2006/main">
-  <p:cSld>
-    <p:spTree>
-      <p:nvGrpSpPr>
-        <p:cNvPr id="1" name=""/>
-        <p:cNvGrpSpPr/>
-        <p:nvPr/>
-      </p:nvGrpSpPr>
-      <p:grpSpPr>
-        <a:xfrm>
-          <a:off x="0" y="0"/>
-          <a:ext cx="0" cy="0"/>
-          <a:chOff x="0" y="0"/>
-          <a:chExt cx="0" cy="0"/>
-        </a:xfrm>
-      </p:grpSpPr>
-      <p:sp>
-        <p:nvSpPr>
-          <p:cNvPr id="2" name="Título 1"/>
-          <p:cNvSpPr>
-            <a:spLocks noGrp="1"/>
-          </p:cNvSpPr>
-          <p:nvPr>
-            <p:ph type="title"/>
-          </p:nvPr>
-        </p:nvSpPr>
-        <p:spPr/>
-        <p:txBody>
-          <a:bodyPr/>
-          <a:lstStyle/>
-          <a:p>
-            <a:r>
-              <a:rPr lang="pt-BR" dirty="0" smtClean="0"/>
-              <a:t>Broadcast dinâmico</a:t>
-            </a:r>
-            <a:endParaRPr lang="pt-BR" dirty="0"/>
-          </a:p>
-        </p:txBody>
-      </p:sp>
-      <p:pic>
-        <p:nvPicPr>
-          <p:cNvPr id="2050" name="Picture 2"/>
-          <p:cNvPicPr>
-            <a:picLocks noChangeAspect="1" noChangeArrowheads="1"/>
-          </p:cNvPicPr>
-          <p:nvPr/>
-        </p:nvPicPr>
-        <p:blipFill>
-          <a:blip r:embed="rId2"/>
-          <a:srcRect/>
-          <a:stretch>
-            <a:fillRect/>
-          </a:stretch>
-        </p:blipFill>
-        <p:spPr bwMode="auto">
-          <a:xfrm>
-            <a:off x="1" y="1285860"/>
-            <a:ext cx="9143999" cy="4457798"/>
-          </a:xfrm>
-          <a:prstGeom prst="rect">
-            <a:avLst/>
-          </a:prstGeom>
-          <a:noFill/>
-          <a:ln w="9525">
-            <a:noFill/>
-            <a:miter lim="800000"/>
-            <a:headEnd/>
-            <a:tailEnd/>
-          </a:ln>
-          <a:effectLst/>
-        </p:spPr>
-      </p:pic>
-    </p:spTree>
-  </p:cSld>
-  <p:clrMapOvr>
-    <a:masterClrMapping/>
-  </p:clrMapOvr>
 </p:sld>
 </file>
 
@@ -3829,7 +4183,7 @@
           <a:p>
             <a:r>
               <a:rPr lang="pt-BR" dirty="0" smtClean="0"/>
-              <a:t>Broadcast</a:t>
+              <a:t>Service</a:t>
             </a:r>
             <a:endParaRPr lang="pt-BR" dirty="0"/>
           </a:p>
@@ -3877,7 +4231,7 @@
         </p:nvSpPr>
         <p:spPr bwMode="auto">
           <a:xfrm>
-            <a:off x="155575" y="-144463"/>
+            <a:off x="1679575" y="-144463"/>
             <a:ext cx="304800" cy="304801"/>
           </a:xfrm>
           <a:prstGeom prst="rect">
@@ -3907,7 +4261,7 @@
         </p:nvSpPr>
         <p:spPr bwMode="auto">
           <a:xfrm>
-            <a:off x="155575" y="-144463"/>
+            <a:off x="1679575" y="-144463"/>
             <a:ext cx="304800" cy="304801"/>
           </a:xfrm>
           <a:prstGeom prst="rect">
@@ -3937,7 +4291,7 @@
         </p:nvSpPr>
         <p:spPr bwMode="auto">
           <a:xfrm>
-            <a:off x="155575" y="-144463"/>
+            <a:off x="1679575" y="-144463"/>
             <a:ext cx="304800" cy="304801"/>
           </a:xfrm>
           <a:prstGeom prst="rect">
@@ -3960,7 +4314,7 @@
     </p:spTree>
     <p:extLst>
       <p:ext uri="{BB962C8B-B14F-4D97-AF65-F5344CB8AC3E}">
-        <p14:creationId xmlns="" xmlns:p14="http://schemas.microsoft.com/office/powerpoint/2010/main" val="556042201"/>
+        <p14:creationId xmlns:p14="http://schemas.microsoft.com/office/powerpoint/2010/main" val="556042201"/>
       </p:ext>
     </p:extLst>
   </p:cSld>
@@ -4011,7 +4365,7 @@
           <a:p>
             <a:r>
               <a:rPr lang="pt-BR" dirty="0" smtClean="0"/>
-              <a:t>Broadcast</a:t>
+              <a:t>Service</a:t>
             </a:r>
             <a:endParaRPr lang="pt-BR" dirty="0"/>
           </a:p>
@@ -4036,42 +4390,128 @@
           <a:p>
             <a:r>
               <a:rPr lang="pt-BR" dirty="0" smtClean="0"/>
-              <a:t>Esta mensagem é chamada de </a:t>
-            </a:r>
-            <a:r>
-              <a:rPr lang="pt-BR" i="1" dirty="0" smtClean="0"/>
-              <a:t>broadcast</a:t>
+              <a:t>Execução </a:t>
+            </a:r>
+            <a:r>
+              <a:rPr lang="pt-BR" dirty="0"/>
+              <a:t>em segundo plano mesmo que o usuário alterne para outro aplicativo. </a:t>
             </a:r>
             <a:r>
               <a:rPr lang="pt-BR" dirty="0" smtClean="0"/>
-              <a:t> e o componente responsável por respondê-la é chamado de </a:t>
-            </a:r>
-            <a:r>
-              <a:rPr lang="pt-BR" i="1" dirty="0" smtClean="0"/>
-              <a:t>Broadcast </a:t>
-            </a:r>
-            <a:r>
-              <a:rPr lang="pt-BR" i="1" dirty="0" err="1" smtClean="0"/>
-              <a:t>Receiver</a:t>
-            </a:r>
-            <a:r>
+              <a:t/>
+            </a:r>
+            <a:br>
               <a:rPr lang="pt-BR" dirty="0" smtClean="0"/>
-              <a:t>.</a:t>
-            </a:r>
-            <a:endParaRPr lang="pt-BR" b="1" i="1" dirty="0">
-              <a:solidFill>
-                <a:schemeClr val="accent1">
-                  <a:lumMod val="50000"/>
-                </a:schemeClr>
-              </a:solidFill>
-            </a:endParaRPr>
+            </a:br>
+            <a:endParaRPr lang="pt-BR" dirty="0" smtClean="0"/>
+          </a:p>
+          <a:p>
+            <a:r>
+              <a:rPr lang="pt-BR" dirty="0" smtClean="0"/>
+              <a:t>Além </a:t>
+            </a:r>
+            <a:r>
+              <a:rPr lang="pt-BR" dirty="0"/>
+              <a:t>disso, um componente poderá se vincular a um serviço para interagir com ele e até estabelecer comunicação entre processos (IPC). </a:t>
+            </a:r>
+            <a:endParaRPr lang="pt-BR" dirty="0" smtClean="0"/>
+          </a:p>
+        </p:txBody>
+      </p:sp>
+      <p:sp>
+        <p:nvSpPr>
+          <p:cNvPr id="7170" name="AutoShape 2" descr="http://upload.wikimedia.org/wikipedia/commons/d/dc/Broadcast.svg"/>
+          <p:cNvSpPr>
+            <a:spLocks noChangeAspect="1" noChangeArrowheads="1"/>
+          </p:cNvSpPr>
+          <p:nvPr/>
+        </p:nvSpPr>
+        <p:spPr bwMode="auto">
+          <a:xfrm>
+            <a:off x="1679575" y="-144463"/>
+            <a:ext cx="304800" cy="304801"/>
+          </a:xfrm>
+          <a:prstGeom prst="rect">
+            <a:avLst/>
+          </a:prstGeom>
+          <a:noFill/>
+        </p:spPr>
+        <p:txBody>
+          <a:bodyPr vert="horz" wrap="square" lIns="91440" tIns="45720" rIns="91440" bIns="45720" numCol="1" anchor="t" anchorCtr="0" compatLnSpc="1">
+            <a:prstTxWarp prst="textNoShape">
+              <a:avLst/>
+            </a:prstTxWarp>
+          </a:bodyPr>
+          <a:lstStyle/>
+          <a:p>
+            <a:endParaRPr lang="pt-BR"/>
+          </a:p>
+        </p:txBody>
+      </p:sp>
+      <p:sp>
+        <p:nvSpPr>
+          <p:cNvPr id="7172" name="AutoShape 4" descr="http://upload.wikimedia.org/wikipedia/commons/d/dc/Broadcast.svg"/>
+          <p:cNvSpPr>
+            <a:spLocks noChangeAspect="1" noChangeArrowheads="1"/>
+          </p:cNvSpPr>
+          <p:nvPr/>
+        </p:nvSpPr>
+        <p:spPr bwMode="auto">
+          <a:xfrm>
+            <a:off x="1679575" y="-144463"/>
+            <a:ext cx="304800" cy="304801"/>
+          </a:xfrm>
+          <a:prstGeom prst="rect">
+            <a:avLst/>
+          </a:prstGeom>
+          <a:noFill/>
+        </p:spPr>
+        <p:txBody>
+          <a:bodyPr vert="horz" wrap="square" lIns="91440" tIns="45720" rIns="91440" bIns="45720" numCol="1" anchor="t" anchorCtr="0" compatLnSpc="1">
+            <a:prstTxWarp prst="textNoShape">
+              <a:avLst/>
+            </a:prstTxWarp>
+          </a:bodyPr>
+          <a:lstStyle/>
+          <a:p>
+            <a:endParaRPr lang="pt-BR"/>
+          </a:p>
+        </p:txBody>
+      </p:sp>
+      <p:sp>
+        <p:nvSpPr>
+          <p:cNvPr id="7174" name="AutoShape 6" descr="http://upload.wikimedia.org/wikipedia/commons/d/dc/Broadcast.svg"/>
+          <p:cNvSpPr>
+            <a:spLocks noChangeAspect="1" noChangeArrowheads="1"/>
+          </p:cNvSpPr>
+          <p:nvPr/>
+        </p:nvSpPr>
+        <p:spPr bwMode="auto">
+          <a:xfrm>
+            <a:off x="1679575" y="-144463"/>
+            <a:ext cx="304800" cy="304801"/>
+          </a:xfrm>
+          <a:prstGeom prst="rect">
+            <a:avLst/>
+          </a:prstGeom>
+          <a:noFill/>
+        </p:spPr>
+        <p:txBody>
+          <a:bodyPr vert="horz" wrap="square" lIns="91440" tIns="45720" rIns="91440" bIns="45720" numCol="1" anchor="t" anchorCtr="0" compatLnSpc="1">
+            <a:prstTxWarp prst="textNoShape">
+              <a:avLst/>
+            </a:prstTxWarp>
+          </a:bodyPr>
+          <a:lstStyle/>
+          <a:p>
+            <a:endParaRPr lang="pt-BR"/>
           </a:p>
         </p:txBody>
       </p:sp>
     </p:spTree>
     <p:extLst>
       <p:ext uri="{BB962C8B-B14F-4D97-AF65-F5344CB8AC3E}">
-        <p14:creationId xmlns="" xmlns:p14="http://schemas.microsoft.com/office/powerpoint/2010/main" val="556042201"/>
+        <p14:creationId xmlns:p14="http://schemas.microsoft.com/office/powerpoint/2010/main" val="2410789962"/>
       </p:ext>
     </p:extLst>
   </p:cSld>
@@ -4122,7 +4562,7 @@
           <a:p>
             <a:r>
               <a:rPr lang="pt-BR" dirty="0" smtClean="0"/>
-              <a:t>Exemplos de Broadcast</a:t>
+              <a:t>Service</a:t>
             </a:r>
             <a:endParaRPr lang="pt-BR" dirty="0"/>
           </a:p>
@@ -4141,76 +4581,182 @@
         <p:spPr/>
         <p:txBody>
           <a:bodyPr>
-            <a:normAutofit lnSpcReduction="10000"/>
+            <a:normAutofit/>
           </a:bodyPr>
           <a:lstStyle/>
           <a:p>
-            <a:pPr marL="0" indent="0"/>
+            <a:pPr marL="0" indent="0">
+              <a:buNone/>
+            </a:pPr>
+            <a:r>
+              <a:rPr lang="pt-BR" dirty="0"/>
+              <a:t>Por exemplo, um serviço pode lidar </a:t>
+            </a:r>
             <a:r>
               <a:rPr lang="pt-BR" dirty="0" smtClean="0"/>
-              <a:t> Bateria do dispositivo está fraca;</a:t>
-            </a:r>
-          </a:p>
-          <a:p>
-            <a:pPr marL="0" indent="0"/>
+              <a:t>com:</a:t>
+            </a:r>
+          </a:p>
+          <a:p>
             <a:r>
               <a:rPr lang="pt-BR" dirty="0" smtClean="0"/>
-              <a:t> Tela do dispositivo é desligada;</a:t>
-            </a:r>
-          </a:p>
-          <a:p>
-            <a:pPr marL="0" indent="0"/>
+              <a:t>Transações </a:t>
+            </a:r>
+            <a:r>
+              <a:rPr lang="pt-BR" dirty="0"/>
+              <a:t>de </a:t>
+            </a:r>
             <a:r>
               <a:rPr lang="pt-BR" dirty="0" smtClean="0"/>
-              <a:t> Carregador é plugado ao dispositivo;</a:t>
-            </a:r>
-          </a:p>
-          <a:p>
-            <a:pPr marL="0" indent="0"/>
+              <a:t>rede; </a:t>
+            </a:r>
+          </a:p>
+          <a:p>
+            <a:r>
+              <a:rPr lang="pt-BR" dirty="0"/>
+              <a:t>R</a:t>
+            </a:r>
             <a:r>
               <a:rPr lang="pt-BR" dirty="0" smtClean="0"/>
-              <a:t> Fone de ouvido é conectado;</a:t>
-            </a:r>
-          </a:p>
-          <a:p>
-            <a:pPr marL="0" indent="0"/>
+              <a:t>eproduzir </a:t>
+            </a:r>
+            <a:r>
+              <a:rPr lang="pt-BR" dirty="0"/>
+              <a:t>música, </a:t>
+            </a:r>
+            <a:endParaRPr lang="pt-BR" dirty="0" smtClean="0"/>
+          </a:p>
+          <a:p>
             <a:r>
               <a:rPr lang="pt-BR" dirty="0" smtClean="0"/>
-              <a:t> Chamada telefônica é recebida;</a:t>
-            </a:r>
-          </a:p>
-          <a:p>
-            <a:pPr marL="0" indent="0"/>
+              <a:t>Executar </a:t>
+            </a:r>
+            <a:r>
+              <a:rPr lang="pt-BR" dirty="0"/>
+              <a:t>E/S de arquivos, </a:t>
+            </a:r>
+            <a:endParaRPr lang="pt-BR" dirty="0" smtClean="0"/>
+          </a:p>
+          <a:p>
             <a:r>
               <a:rPr lang="pt-BR" dirty="0" smtClean="0"/>
-              <a:t> Quando o sistema é iniciado</a:t>
+              <a:t>Interagir </a:t>
+            </a:r>
+            <a:r>
+              <a:rPr lang="pt-BR" dirty="0"/>
+              <a:t>com um provedor de </a:t>
             </a:r>
             <a:r>
               <a:rPr lang="pt-BR" dirty="0" smtClean="0"/>
-              <a:t>;</a:t>
-            </a:r>
-          </a:p>
-          <a:p>
-            <a:pPr marL="0" indent="0"/>
+              <a:t>conteúdo</a:t>
+            </a:r>
+          </a:p>
+          <a:p>
             <a:r>
               <a:rPr lang="pt-BR" dirty="0" smtClean="0"/>
-              <a:t>Recebimento de SMS;</a:t>
-            </a:r>
-            <a:endParaRPr lang="pt-BR" dirty="0" smtClean="0"/>
-          </a:p>
-          <a:p>
-            <a:pPr marL="0" indent="0"/>
-            <a:r>
-              <a:rPr lang="pt-BR" dirty="0" smtClean="0"/>
-              <a:t> Vários outros.</a:t>
-            </a:r>
+              <a:t>Tudo </a:t>
+            </a:r>
+            <a:r>
+              <a:rPr lang="pt-BR" dirty="0"/>
+              <a:t>a partir do segundo plano.</a:t>
+            </a:r>
+          </a:p>
+        </p:txBody>
+      </p:sp>
+      <p:sp>
+        <p:nvSpPr>
+          <p:cNvPr id="7170" name="AutoShape 2" descr="http://upload.wikimedia.org/wikipedia/commons/d/dc/Broadcast.svg"/>
+          <p:cNvSpPr>
+            <a:spLocks noChangeAspect="1" noChangeArrowheads="1"/>
+          </p:cNvSpPr>
+          <p:nvPr/>
+        </p:nvSpPr>
+        <p:spPr bwMode="auto">
+          <a:xfrm>
+            <a:off x="1679575" y="-144463"/>
+            <a:ext cx="304800" cy="304801"/>
+          </a:xfrm>
+          <a:prstGeom prst="rect">
+            <a:avLst/>
+          </a:prstGeom>
+          <a:noFill/>
+        </p:spPr>
+        <p:txBody>
+          <a:bodyPr vert="horz" wrap="square" lIns="91440" tIns="45720" rIns="91440" bIns="45720" numCol="1" anchor="t" anchorCtr="0" compatLnSpc="1">
+            <a:prstTxWarp prst="textNoShape">
+              <a:avLst/>
+            </a:prstTxWarp>
+          </a:bodyPr>
+          <a:lstStyle/>
+          <a:p>
+            <a:endParaRPr lang="pt-BR"/>
+          </a:p>
+        </p:txBody>
+      </p:sp>
+      <p:sp>
+        <p:nvSpPr>
+          <p:cNvPr id="7172" name="AutoShape 4" descr="http://upload.wikimedia.org/wikipedia/commons/d/dc/Broadcast.svg"/>
+          <p:cNvSpPr>
+            <a:spLocks noChangeAspect="1" noChangeArrowheads="1"/>
+          </p:cNvSpPr>
+          <p:nvPr/>
+        </p:nvSpPr>
+        <p:spPr bwMode="auto">
+          <a:xfrm>
+            <a:off x="1679575" y="-144463"/>
+            <a:ext cx="304800" cy="304801"/>
+          </a:xfrm>
+          <a:prstGeom prst="rect">
+            <a:avLst/>
+          </a:prstGeom>
+          <a:noFill/>
+        </p:spPr>
+        <p:txBody>
+          <a:bodyPr vert="horz" wrap="square" lIns="91440" tIns="45720" rIns="91440" bIns="45720" numCol="1" anchor="t" anchorCtr="0" compatLnSpc="1">
+            <a:prstTxWarp prst="textNoShape">
+              <a:avLst/>
+            </a:prstTxWarp>
+          </a:bodyPr>
+          <a:lstStyle/>
+          <a:p>
+            <a:endParaRPr lang="pt-BR"/>
+          </a:p>
+        </p:txBody>
+      </p:sp>
+      <p:sp>
+        <p:nvSpPr>
+          <p:cNvPr id="7174" name="AutoShape 6" descr="http://upload.wikimedia.org/wikipedia/commons/d/dc/Broadcast.svg"/>
+          <p:cNvSpPr>
+            <a:spLocks noChangeAspect="1" noChangeArrowheads="1"/>
+          </p:cNvSpPr>
+          <p:nvPr/>
+        </p:nvSpPr>
+        <p:spPr bwMode="auto">
+          <a:xfrm>
+            <a:off x="1679575" y="-144463"/>
+            <a:ext cx="304800" cy="304801"/>
+          </a:xfrm>
+          <a:prstGeom prst="rect">
+            <a:avLst/>
+          </a:prstGeom>
+          <a:noFill/>
+        </p:spPr>
+        <p:txBody>
+          <a:bodyPr vert="horz" wrap="square" lIns="91440" tIns="45720" rIns="91440" bIns="45720" numCol="1" anchor="t" anchorCtr="0" compatLnSpc="1">
+            <a:prstTxWarp prst="textNoShape">
+              <a:avLst/>
+            </a:prstTxWarp>
+          </a:bodyPr>
+          <a:lstStyle/>
+          <a:p>
+            <a:endParaRPr lang="pt-BR"/>
           </a:p>
         </p:txBody>
       </p:sp>
     </p:spTree>
     <p:extLst>
       <p:ext uri="{BB962C8B-B14F-4D97-AF65-F5344CB8AC3E}">
-        <p14:creationId xmlns="" xmlns:p14="http://schemas.microsoft.com/office/powerpoint/2010/main" val="2178916405"/>
+        <p14:creationId xmlns:p14="http://schemas.microsoft.com/office/powerpoint/2010/main" val="3020964006"/>
       </p:ext>
     </p:extLst>
   </p:cSld>
@@ -4261,42 +4807,137 @@
           <a:p>
             <a:r>
               <a:rPr lang="pt-BR" dirty="0" smtClean="0"/>
-              <a:t>Exemplo de broadcast</a:t>
+              <a:t>Service</a:t>
             </a:r>
             <a:endParaRPr lang="pt-BR" dirty="0"/>
           </a:p>
         </p:txBody>
       </p:sp>
-      <p:pic>
-        <p:nvPicPr>
-          <p:cNvPr id="5122" name="Picture 2" descr="android_esquema_broadcast_receiver_bateria_fraca"/>
-          <p:cNvPicPr>
-            <a:picLocks noChangeAspect="1" noChangeArrowheads="1"/>
-          </p:cNvPicPr>
+      <p:sp>
+        <p:nvSpPr>
+          <p:cNvPr id="3" name="Content Placeholder 2"/>
+          <p:cNvSpPr>
+            <a:spLocks noGrp="1"/>
+          </p:cNvSpPr>
+          <p:nvPr>
+            <p:ph idx="1"/>
+          </p:nvPr>
+        </p:nvSpPr>
+        <p:spPr/>
+        <p:txBody>
+          <a:bodyPr>
+            <a:normAutofit/>
+          </a:bodyPr>
+          <a:lstStyle/>
+          <a:p>
+            <a:pPr marL="0" indent="0">
+              <a:buNone/>
+            </a:pPr>
+            <a:r>
+              <a:rPr lang="pt-BR" sz="4400" dirty="0"/>
+              <a:t>Um serviço pode essencialmente ter duas </a:t>
+            </a:r>
+            <a:r>
+              <a:rPr lang="pt-BR" sz="4400" dirty="0"/>
+              <a:t>formas</a:t>
+            </a:r>
+          </a:p>
+        </p:txBody>
+      </p:sp>
+      <p:sp>
+        <p:nvSpPr>
+          <p:cNvPr id="7170" name="AutoShape 2" descr="http://upload.wikimedia.org/wikipedia/commons/d/dc/Broadcast.svg"/>
+          <p:cNvSpPr>
+            <a:spLocks noChangeAspect="1" noChangeArrowheads="1"/>
+          </p:cNvSpPr>
           <p:nvPr/>
-        </p:nvPicPr>
-        <p:blipFill>
-          <a:blip r:embed="rId2"/>
-          <a:srcRect/>
-          <a:stretch>
-            <a:fillRect/>
-          </a:stretch>
-        </p:blipFill>
+        </p:nvSpPr>
         <p:spPr bwMode="auto">
           <a:xfrm>
-            <a:off x="309158" y="1643050"/>
-            <a:ext cx="8567685" cy="4429156"/>
+            <a:off x="1679575" y="-144463"/>
+            <a:ext cx="304800" cy="304801"/>
           </a:xfrm>
           <a:prstGeom prst="rect">
             <a:avLst/>
           </a:prstGeom>
           <a:noFill/>
         </p:spPr>
-      </p:pic>
+        <p:txBody>
+          <a:bodyPr vert="horz" wrap="square" lIns="91440" tIns="45720" rIns="91440" bIns="45720" numCol="1" anchor="t" anchorCtr="0" compatLnSpc="1">
+            <a:prstTxWarp prst="textNoShape">
+              <a:avLst/>
+            </a:prstTxWarp>
+          </a:bodyPr>
+          <a:lstStyle/>
+          <a:p>
+            <a:endParaRPr lang="pt-BR"/>
+          </a:p>
+        </p:txBody>
+      </p:sp>
+      <p:sp>
+        <p:nvSpPr>
+          <p:cNvPr id="7172" name="AutoShape 4" descr="http://upload.wikimedia.org/wikipedia/commons/d/dc/Broadcast.svg"/>
+          <p:cNvSpPr>
+            <a:spLocks noChangeAspect="1" noChangeArrowheads="1"/>
+          </p:cNvSpPr>
+          <p:nvPr/>
+        </p:nvSpPr>
+        <p:spPr bwMode="auto">
+          <a:xfrm>
+            <a:off x="1679575" y="-144463"/>
+            <a:ext cx="304800" cy="304801"/>
+          </a:xfrm>
+          <a:prstGeom prst="rect">
+            <a:avLst/>
+          </a:prstGeom>
+          <a:noFill/>
+        </p:spPr>
+        <p:txBody>
+          <a:bodyPr vert="horz" wrap="square" lIns="91440" tIns="45720" rIns="91440" bIns="45720" numCol="1" anchor="t" anchorCtr="0" compatLnSpc="1">
+            <a:prstTxWarp prst="textNoShape">
+              <a:avLst/>
+            </a:prstTxWarp>
+          </a:bodyPr>
+          <a:lstStyle/>
+          <a:p>
+            <a:endParaRPr lang="pt-BR"/>
+          </a:p>
+        </p:txBody>
+      </p:sp>
+      <p:sp>
+        <p:nvSpPr>
+          <p:cNvPr id="7174" name="AutoShape 6" descr="http://upload.wikimedia.org/wikipedia/commons/d/dc/Broadcast.svg"/>
+          <p:cNvSpPr>
+            <a:spLocks noChangeAspect="1" noChangeArrowheads="1"/>
+          </p:cNvSpPr>
+          <p:nvPr/>
+        </p:nvSpPr>
+        <p:spPr bwMode="auto">
+          <a:xfrm>
+            <a:off x="1679575" y="-144463"/>
+            <a:ext cx="304800" cy="304801"/>
+          </a:xfrm>
+          <a:prstGeom prst="rect">
+            <a:avLst/>
+          </a:prstGeom>
+          <a:noFill/>
+        </p:spPr>
+        <p:txBody>
+          <a:bodyPr vert="horz" wrap="square" lIns="91440" tIns="45720" rIns="91440" bIns="45720" numCol="1" anchor="t" anchorCtr="0" compatLnSpc="1">
+            <a:prstTxWarp prst="textNoShape">
+              <a:avLst/>
+            </a:prstTxWarp>
+          </a:bodyPr>
+          <a:lstStyle/>
+          <a:p>
+            <a:endParaRPr lang="pt-BR"/>
+          </a:p>
+        </p:txBody>
+      </p:sp>
     </p:spTree>
     <p:extLst>
       <p:ext uri="{BB962C8B-B14F-4D97-AF65-F5344CB8AC3E}">
-        <p14:creationId xmlns="" xmlns:p14="http://schemas.microsoft.com/office/powerpoint/2010/main" val="2733026519"/>
+        <p14:creationId xmlns:p14="http://schemas.microsoft.com/office/powerpoint/2010/main" val="1729499791"/>
       </p:ext>
     </p:extLst>
   </p:cSld>
@@ -4347,11 +4988,7 @@
           <a:p>
             <a:r>
               <a:rPr lang="pt-BR" dirty="0" smtClean="0"/>
-              <a:t>Cenário para Broadcast </a:t>
-            </a:r>
-            <a:r>
-              <a:rPr lang="pt-BR" dirty="0" err="1" smtClean="0"/>
-              <a:t>receiver</a:t>
+              <a:t>Service</a:t>
             </a:r>
             <a:endParaRPr lang="pt-BR" dirty="0"/>
           </a:p>
@@ -4374,32 +5011,154 @@
           </a:bodyPr>
           <a:lstStyle/>
           <a:p>
+            <a:pPr marL="0" indent="0">
+              <a:buNone/>
+            </a:pPr>
             <a:r>
               <a:rPr lang="pt-BR" dirty="0" smtClean="0"/>
-              <a:t>Imagine, por exemplo, que você resolveu acoplar um </a:t>
+              <a:t>INICIADO</a:t>
+            </a:r>
+          </a:p>
+          <a:p>
+            <a:r>
+              <a:rPr lang="pt-BR" dirty="0"/>
+              <a:t>Um serviço é "iniciado" quando um componente do aplicativo (como </a:t>
+            </a:r>
+            <a:r>
+              <a:rPr lang="pt-BR" dirty="0" smtClean="0"/>
+              <a:t>uma </a:t>
             </a:r>
             <a:r>
               <a:rPr lang="pt-BR" dirty="0" err="1" smtClean="0"/>
-              <a:t>tablet</a:t>
+              <a:t>activity</a:t>
             </a:r>
             <a:r>
               <a:rPr lang="pt-BR" dirty="0" smtClean="0"/>
-              <a:t> ao painel do seu carro para usá-lo como central multimídia e computador de bordo, conectando seu cabo de força à uma fonte de energia do carro e a saída de áudio no aparelho de som do carro. </a:t>
-            </a:r>
-            <a:endParaRPr lang="pt-BR" dirty="0"/>
+              <a:t>) </a:t>
+            </a:r>
+            <a:r>
+              <a:rPr lang="pt-BR" dirty="0"/>
+              <a:t>inicia-o chamando </a:t>
+            </a:r>
+            <a:r>
+              <a:rPr lang="pt-BR" dirty="0" err="1"/>
+              <a:t>startService</a:t>
+            </a:r>
+            <a:r>
+              <a:rPr lang="pt-BR" dirty="0"/>
+              <a:t>(). </a:t>
+            </a:r>
+            <a:endParaRPr lang="pt-BR" dirty="0" smtClean="0"/>
+          </a:p>
+        </p:txBody>
+      </p:sp>
+      <p:sp>
+        <p:nvSpPr>
+          <p:cNvPr id="7170" name="AutoShape 2" descr="http://upload.wikimedia.org/wikipedia/commons/d/dc/Broadcast.svg"/>
+          <p:cNvSpPr>
+            <a:spLocks noChangeAspect="1" noChangeArrowheads="1"/>
+          </p:cNvSpPr>
+          <p:nvPr/>
+        </p:nvSpPr>
+        <p:spPr bwMode="auto">
+          <a:xfrm>
+            <a:off x="1679575" y="-144463"/>
+            <a:ext cx="304800" cy="304801"/>
+          </a:xfrm>
+          <a:prstGeom prst="rect">
+            <a:avLst/>
+          </a:prstGeom>
+          <a:noFill/>
+        </p:spPr>
+        <p:txBody>
+          <a:bodyPr vert="horz" wrap="square" lIns="91440" tIns="45720" rIns="91440" bIns="45720" numCol="1" anchor="t" anchorCtr="0" compatLnSpc="1">
+            <a:prstTxWarp prst="textNoShape">
+              <a:avLst/>
+            </a:prstTxWarp>
+          </a:bodyPr>
+          <a:lstStyle/>
+          <a:p>
+            <a:endParaRPr lang="pt-BR"/>
+          </a:p>
+        </p:txBody>
+      </p:sp>
+      <p:sp>
+        <p:nvSpPr>
+          <p:cNvPr id="7172" name="AutoShape 4" descr="http://upload.wikimedia.org/wikipedia/commons/d/dc/Broadcast.svg"/>
+          <p:cNvSpPr>
+            <a:spLocks noChangeAspect="1" noChangeArrowheads="1"/>
+          </p:cNvSpPr>
+          <p:nvPr/>
+        </p:nvSpPr>
+        <p:spPr bwMode="auto">
+          <a:xfrm>
+            <a:off x="1679575" y="-144463"/>
+            <a:ext cx="304800" cy="304801"/>
+          </a:xfrm>
+          <a:prstGeom prst="rect">
+            <a:avLst/>
+          </a:prstGeom>
+          <a:noFill/>
+        </p:spPr>
+        <p:txBody>
+          <a:bodyPr vert="horz" wrap="square" lIns="91440" tIns="45720" rIns="91440" bIns="45720" numCol="1" anchor="t" anchorCtr="0" compatLnSpc="1">
+            <a:prstTxWarp prst="textNoShape">
+              <a:avLst/>
+            </a:prstTxWarp>
+          </a:bodyPr>
+          <a:lstStyle/>
+          <a:p>
+            <a:endParaRPr lang="pt-BR"/>
+          </a:p>
+        </p:txBody>
+      </p:sp>
+      <p:sp>
+        <p:nvSpPr>
+          <p:cNvPr id="7174" name="AutoShape 6" descr="http://upload.wikimedia.org/wikipedia/commons/d/dc/Broadcast.svg"/>
+          <p:cNvSpPr>
+            <a:spLocks noChangeAspect="1" noChangeArrowheads="1"/>
+          </p:cNvSpPr>
+          <p:nvPr/>
+        </p:nvSpPr>
+        <p:spPr bwMode="auto">
+          <a:xfrm>
+            <a:off x="1679575" y="-144463"/>
+            <a:ext cx="304800" cy="304801"/>
+          </a:xfrm>
+          <a:prstGeom prst="rect">
+            <a:avLst/>
+          </a:prstGeom>
+          <a:noFill/>
+        </p:spPr>
+        <p:txBody>
+          <a:bodyPr vert="horz" wrap="square" lIns="91440" tIns="45720" rIns="91440" bIns="45720" numCol="1" anchor="t" anchorCtr="0" compatLnSpc="1">
+            <a:prstTxWarp prst="textNoShape">
+              <a:avLst/>
+            </a:prstTxWarp>
+          </a:bodyPr>
+          <a:lstStyle/>
+          <a:p>
+            <a:endParaRPr lang="pt-BR"/>
           </a:p>
         </p:txBody>
       </p:sp>
     </p:spTree>
     <p:extLst>
       <p:ext uri="{BB962C8B-B14F-4D97-AF65-F5344CB8AC3E}">
-        <p14:creationId xmlns="" xmlns:p14="http://schemas.microsoft.com/office/powerpoint/2010/main" val="3876958284"/>
+        <p14:creationId xmlns:p14="http://schemas.microsoft.com/office/powerpoint/2010/main" val="1744962759"/>
       </p:ext>
     </p:extLst>
   </p:cSld>
   <p:clrMapOvr>
     <a:masterClrMapping/>
   </p:clrMapOvr>
+  <p:timing>
+    <p:tnLst>
+      <p:par>
+        <p:cTn id="1" dur="indefinite" restart="never" nodeType="tmRoot"/>
+      </p:par>
+    </p:tnLst>
+  </p:timing>
 </p:sld>
 </file>
 
@@ -4437,11 +5196,7 @@
           <a:p>
             <a:r>
               <a:rPr lang="pt-BR" dirty="0" smtClean="0"/>
-              <a:t>Cenário para Broadcast </a:t>
-            </a:r>
-            <a:r>
-              <a:rPr lang="pt-BR" dirty="0" err="1" smtClean="0"/>
-              <a:t>receiver</a:t>
+              <a:t>Service</a:t>
             </a:r>
             <a:endParaRPr lang="pt-BR" dirty="0"/>
           </a:p>
@@ -4464,31 +5219,130 @@
           </a:bodyPr>
           <a:lstStyle/>
           <a:p>
+            <a:pPr marL="0" indent="0">
+              <a:buNone/>
+            </a:pPr>
             <a:r>
               <a:rPr lang="pt-BR" dirty="0" smtClean="0"/>
-              <a:t>Claro que você correria o risco de alguém abrir o seu carro para furtar este </a:t>
-            </a:r>
-            <a:r>
-              <a:rPr lang="pt-BR" dirty="0" err="1" smtClean="0"/>
-              <a:t>tablet</a:t>
-            </a:r>
-            <a:r>
-              <a:rPr lang="pt-BR" dirty="0" smtClean="0"/>
-              <a:t>. </a:t>
-            </a:r>
+              <a:t>INICIADO</a:t>
+            </a:r>
+          </a:p>
+          <a:p>
+            <a:r>
+              <a:rPr lang="pt-BR" dirty="0"/>
+              <a:t>Quando iniciado, um serviço pode ficar em execução em segundo plano indefinidamente, mesmo que o componente que o iniciou seja destruído. </a:t>
+            </a:r>
+            <a:endParaRPr lang="pt-BR" dirty="0" smtClean="0"/>
+          </a:p>
+        </p:txBody>
+      </p:sp>
+      <p:sp>
+        <p:nvSpPr>
+          <p:cNvPr id="7170" name="AutoShape 2" descr="http://upload.wikimedia.org/wikipedia/commons/d/dc/Broadcast.svg"/>
+          <p:cNvSpPr>
+            <a:spLocks noChangeAspect="1" noChangeArrowheads="1"/>
+          </p:cNvSpPr>
+          <p:nvPr/>
+        </p:nvSpPr>
+        <p:spPr bwMode="auto">
+          <a:xfrm>
+            <a:off x="1679575" y="-144463"/>
+            <a:ext cx="304800" cy="304801"/>
+          </a:xfrm>
+          <a:prstGeom prst="rect">
+            <a:avLst/>
+          </a:prstGeom>
+          <a:noFill/>
+        </p:spPr>
+        <p:txBody>
+          <a:bodyPr vert="horz" wrap="square" lIns="91440" tIns="45720" rIns="91440" bIns="45720" numCol="1" anchor="t" anchorCtr="0" compatLnSpc="1">
+            <a:prstTxWarp prst="textNoShape">
+              <a:avLst/>
+            </a:prstTxWarp>
+          </a:bodyPr>
+          <a:lstStyle/>
+          <a:p>
+            <a:endParaRPr lang="pt-BR"/>
+          </a:p>
+        </p:txBody>
+      </p:sp>
+      <p:sp>
+        <p:nvSpPr>
+          <p:cNvPr id="7172" name="AutoShape 4" descr="http://upload.wikimedia.org/wikipedia/commons/d/dc/Broadcast.svg"/>
+          <p:cNvSpPr>
+            <a:spLocks noChangeAspect="1" noChangeArrowheads="1"/>
+          </p:cNvSpPr>
+          <p:nvPr/>
+        </p:nvSpPr>
+        <p:spPr bwMode="auto">
+          <a:xfrm>
+            <a:off x="1679575" y="-144463"/>
+            <a:ext cx="304800" cy="304801"/>
+          </a:xfrm>
+          <a:prstGeom prst="rect">
+            <a:avLst/>
+          </a:prstGeom>
+          <a:noFill/>
+        </p:spPr>
+        <p:txBody>
+          <a:bodyPr vert="horz" wrap="square" lIns="91440" tIns="45720" rIns="91440" bIns="45720" numCol="1" anchor="t" anchorCtr="0" compatLnSpc="1">
+            <a:prstTxWarp prst="textNoShape">
+              <a:avLst/>
+            </a:prstTxWarp>
+          </a:bodyPr>
+          <a:lstStyle/>
+          <a:p>
+            <a:endParaRPr lang="pt-BR"/>
+          </a:p>
+        </p:txBody>
+      </p:sp>
+      <p:sp>
+        <p:nvSpPr>
+          <p:cNvPr id="7174" name="AutoShape 6" descr="http://upload.wikimedia.org/wikipedia/commons/d/dc/Broadcast.svg"/>
+          <p:cNvSpPr>
+            <a:spLocks noChangeAspect="1" noChangeArrowheads="1"/>
+          </p:cNvSpPr>
+          <p:nvPr/>
+        </p:nvSpPr>
+        <p:spPr bwMode="auto">
+          <a:xfrm>
+            <a:off x="1679575" y="-144463"/>
+            <a:ext cx="304800" cy="304801"/>
+          </a:xfrm>
+          <a:prstGeom prst="rect">
+            <a:avLst/>
+          </a:prstGeom>
+          <a:noFill/>
+        </p:spPr>
+        <p:txBody>
+          <a:bodyPr vert="horz" wrap="square" lIns="91440" tIns="45720" rIns="91440" bIns="45720" numCol="1" anchor="t" anchorCtr="0" compatLnSpc="1">
+            <a:prstTxWarp prst="textNoShape">
+              <a:avLst/>
+            </a:prstTxWarp>
+          </a:bodyPr>
+          <a:lstStyle/>
+          <a:p>
+            <a:endParaRPr lang="pt-BR"/>
           </a:p>
         </p:txBody>
       </p:sp>
     </p:spTree>
     <p:extLst>
       <p:ext uri="{BB962C8B-B14F-4D97-AF65-F5344CB8AC3E}">
-        <p14:creationId xmlns="" xmlns:p14="http://schemas.microsoft.com/office/powerpoint/2010/main" val="3876958284"/>
+        <p14:creationId xmlns:p14="http://schemas.microsoft.com/office/powerpoint/2010/main" val="992309156"/>
       </p:ext>
     </p:extLst>
   </p:cSld>
   <p:clrMapOvr>
     <a:masterClrMapping/>
   </p:clrMapOvr>
+  <p:timing>
+    <p:tnLst>
+      <p:par>
+        <p:cTn id="1" dur="indefinite" restart="never" nodeType="tmRoot"/>
+      </p:par>
+    </p:tnLst>
+  </p:timing>
 </p:sld>
 </file>
 
@@ -4526,11 +5380,7 @@
           <a:p>
             <a:r>
               <a:rPr lang="pt-BR" dirty="0" smtClean="0"/>
-              <a:t>Cenário para Broadcast </a:t>
-            </a:r>
-            <a:r>
-              <a:rPr lang="pt-BR" dirty="0" err="1" smtClean="0"/>
-              <a:t>receiver</a:t>
+              <a:t>Service</a:t>
             </a:r>
             <a:endParaRPr lang="pt-BR" dirty="0"/>
           </a:p>
@@ -4549,44 +5399,149 @@
         <p:spPr/>
         <p:txBody>
           <a:bodyPr>
-            <a:normAutofit/>
+            <a:normAutofit fontScale="92500"/>
           </a:bodyPr>
           <a:lstStyle/>
           <a:p>
+            <a:pPr marL="0" indent="0">
+              <a:buNone/>
+            </a:pPr>
             <a:r>
               <a:rPr lang="pt-BR" dirty="0" smtClean="0"/>
-              <a:t>Pensando nessa possibilidade, um simples Broadcast </a:t>
-            </a:r>
-            <a:r>
-              <a:rPr lang="pt-BR" dirty="0" err="1" smtClean="0"/>
-              <a:t>Receiver</a:t>
+              <a:t>INICIADO</a:t>
+            </a:r>
+          </a:p>
+          <a:p>
+            <a:r>
+              <a:rPr lang="pt-BR" dirty="0"/>
+              <a:t>Quando iniciado, um serviço pode ficar em execução em segundo plano indefinidamente, mesmo que o componente que o iniciou seja destruído</a:t>
             </a:r>
             <a:r>
               <a:rPr lang="pt-BR" dirty="0" smtClean="0"/>
-              <a:t> poderia ajudá-lo neste caso, onde uma mensagem SMS (ou e-mail) poderia ser enviada para o seu celular caso alguém desconectasse o cabo de força ou o cabo da saída de áudio deste </a:t>
-            </a:r>
-            <a:r>
-              <a:rPr lang="pt-BR" dirty="0" err="1" smtClean="0"/>
-              <a:t>tablet</a:t>
-            </a:r>
-            <a:r>
-              <a:rPr lang="pt-BR" dirty="0" smtClean="0"/>
-              <a:t> .</a:t>
-            </a:r>
+              <a:t>.</a:t>
+            </a:r>
+          </a:p>
+          <a:p>
             <a:endParaRPr lang="pt-BR" dirty="0"/>
+          </a:p>
+          <a:p>
+            <a:r>
+              <a:rPr lang="pt-BR" dirty="0"/>
+              <a:t>Geralmente, um serviço iniciado realiza uma única operação e não retorna um resultado para o autor da chamada. Por exemplo, ele pode fazer download ou upload de um arquivo pela rede. Quando a operação for concluída, o serviço deverá ser interrompido.</a:t>
+            </a:r>
+          </a:p>
+          <a:p>
+            <a:endParaRPr lang="pt-BR" dirty="0" smtClean="0"/>
+          </a:p>
+        </p:txBody>
+      </p:sp>
+      <p:sp>
+        <p:nvSpPr>
+          <p:cNvPr id="7170" name="AutoShape 2" descr="http://upload.wikimedia.org/wikipedia/commons/d/dc/Broadcast.svg"/>
+          <p:cNvSpPr>
+            <a:spLocks noChangeAspect="1" noChangeArrowheads="1"/>
+          </p:cNvSpPr>
+          <p:nvPr/>
+        </p:nvSpPr>
+        <p:spPr bwMode="auto">
+          <a:xfrm>
+            <a:off x="1679575" y="-144463"/>
+            <a:ext cx="304800" cy="304801"/>
+          </a:xfrm>
+          <a:prstGeom prst="rect">
+            <a:avLst/>
+          </a:prstGeom>
+          <a:noFill/>
+        </p:spPr>
+        <p:txBody>
+          <a:bodyPr vert="horz" wrap="square" lIns="91440" tIns="45720" rIns="91440" bIns="45720" numCol="1" anchor="t" anchorCtr="0" compatLnSpc="1">
+            <a:prstTxWarp prst="textNoShape">
+              <a:avLst/>
+            </a:prstTxWarp>
+          </a:bodyPr>
+          <a:lstStyle/>
+          <a:p>
+            <a:endParaRPr lang="pt-BR"/>
+          </a:p>
+        </p:txBody>
+      </p:sp>
+      <p:sp>
+        <p:nvSpPr>
+          <p:cNvPr id="7172" name="AutoShape 4" descr="http://upload.wikimedia.org/wikipedia/commons/d/dc/Broadcast.svg"/>
+          <p:cNvSpPr>
+            <a:spLocks noChangeAspect="1" noChangeArrowheads="1"/>
+          </p:cNvSpPr>
+          <p:nvPr/>
+        </p:nvSpPr>
+        <p:spPr bwMode="auto">
+          <a:xfrm>
+            <a:off x="1679575" y="-144463"/>
+            <a:ext cx="304800" cy="304801"/>
+          </a:xfrm>
+          <a:prstGeom prst="rect">
+            <a:avLst/>
+          </a:prstGeom>
+          <a:noFill/>
+        </p:spPr>
+        <p:txBody>
+          <a:bodyPr vert="horz" wrap="square" lIns="91440" tIns="45720" rIns="91440" bIns="45720" numCol="1" anchor="t" anchorCtr="0" compatLnSpc="1">
+            <a:prstTxWarp prst="textNoShape">
+              <a:avLst/>
+            </a:prstTxWarp>
+          </a:bodyPr>
+          <a:lstStyle/>
+          <a:p>
+            <a:endParaRPr lang="pt-BR"/>
+          </a:p>
+        </p:txBody>
+      </p:sp>
+      <p:sp>
+        <p:nvSpPr>
+          <p:cNvPr id="7174" name="AutoShape 6" descr="http://upload.wikimedia.org/wikipedia/commons/d/dc/Broadcast.svg"/>
+          <p:cNvSpPr>
+            <a:spLocks noChangeAspect="1" noChangeArrowheads="1"/>
+          </p:cNvSpPr>
+          <p:nvPr/>
+        </p:nvSpPr>
+        <p:spPr bwMode="auto">
+          <a:xfrm>
+            <a:off x="1679575" y="-144463"/>
+            <a:ext cx="304800" cy="304801"/>
+          </a:xfrm>
+          <a:prstGeom prst="rect">
+            <a:avLst/>
+          </a:prstGeom>
+          <a:noFill/>
+        </p:spPr>
+        <p:txBody>
+          <a:bodyPr vert="horz" wrap="square" lIns="91440" tIns="45720" rIns="91440" bIns="45720" numCol="1" anchor="t" anchorCtr="0" compatLnSpc="1">
+            <a:prstTxWarp prst="textNoShape">
+              <a:avLst/>
+            </a:prstTxWarp>
+          </a:bodyPr>
+          <a:lstStyle/>
+          <a:p>
+            <a:endParaRPr lang="pt-BR"/>
           </a:p>
         </p:txBody>
       </p:sp>
     </p:spTree>
     <p:extLst>
       <p:ext uri="{BB962C8B-B14F-4D97-AF65-F5344CB8AC3E}">
-        <p14:creationId xmlns="" xmlns:p14="http://schemas.microsoft.com/office/powerpoint/2010/main" val="3876958284"/>
+        <p14:creationId xmlns:p14="http://schemas.microsoft.com/office/powerpoint/2010/main" val="1832293005"/>
       </p:ext>
     </p:extLst>
   </p:cSld>
   <p:clrMapOvr>
     <a:masterClrMapping/>
   </p:clrMapOvr>
+  <p:timing>
+    <p:tnLst>
+      <p:par>
+        <p:cTn id="1" dur="indefinite" restart="never" nodeType="tmRoot"/>
+      </p:par>
+    </p:tnLst>
+  </p:timing>
 </p:sld>
 </file>
 
@@ -4624,11 +5579,7 @@
           <a:p>
             <a:r>
               <a:rPr lang="pt-BR" dirty="0" smtClean="0"/>
-              <a:t>Cenário para Broadcast </a:t>
-            </a:r>
-            <a:r>
-              <a:rPr lang="pt-BR" dirty="0" err="1" smtClean="0"/>
-              <a:t>receiver</a:t>
+              <a:t>Service</a:t>
             </a:r>
             <a:endParaRPr lang="pt-BR" dirty="0"/>
           </a:p>
@@ -4647,52 +5598,175 @@
         <p:spPr/>
         <p:txBody>
           <a:bodyPr>
-            <a:normAutofit/>
+            <a:normAutofit fontScale="92500"/>
           </a:bodyPr>
           <a:lstStyle/>
           <a:p>
+            <a:pPr marL="0" indent="0">
+              <a:buNone/>
+            </a:pPr>
             <a:r>
               <a:rPr lang="pt-BR" dirty="0" smtClean="0"/>
-              <a:t>Além de enviar um SMS avisando que o dispositivo foi desconectado do painel do carro, o Broadcast </a:t>
-            </a:r>
-            <a:r>
-              <a:rPr lang="pt-BR" dirty="0" err="1" smtClean="0"/>
-              <a:t>Receiver</a:t>
-            </a:r>
+              <a:t>VINCULADO</a:t>
+            </a:r>
+          </a:p>
+          <a:p>
+            <a:pPr marL="0" indent="0">
+              <a:buNone/>
+            </a:pPr>
+            <a:r>
+              <a:rPr lang="pt-BR" dirty="0"/>
+              <a:t>Um serviço é "vinculado" quando um componente do aplicativo chama </a:t>
+            </a:r>
+            <a:r>
+              <a:rPr lang="pt-BR" dirty="0" err="1"/>
+              <a:t>bindService</a:t>
+            </a:r>
+            <a:r>
+              <a:rPr lang="pt-BR" dirty="0"/>
+              <a:t>() para vinculá-lo. </a:t>
+            </a:r>
+            <a:endParaRPr lang="pt-BR" dirty="0" smtClean="0"/>
+          </a:p>
+          <a:p>
+            <a:pPr marL="0" indent="0">
+              <a:buNone/>
+            </a:pPr>
             <a:r>
               <a:rPr lang="pt-BR" dirty="0" smtClean="0"/>
-              <a:t> também poderia ativar um serviço de localização que, de tempos em tempos, lhe enviasse um SMS com a localização geográfica do seu </a:t>
-            </a:r>
-            <a:r>
-              <a:rPr lang="pt-BR" dirty="0" err="1" smtClean="0"/>
-              <a:t>tablet</a:t>
+              <a:t>Oferece </a:t>
+            </a:r>
+            <a:r>
+              <a:rPr lang="pt-BR" dirty="0"/>
+              <a:t>uma interface servidor-cliente que permite que os componentes interajam com a </a:t>
             </a:r>
             <a:r>
               <a:rPr lang="pt-BR" dirty="0" smtClean="0"/>
-              <a:t> obtida através do GPS, ajudando-o na recuperação do seu </a:t>
-            </a:r>
-            <a:r>
-              <a:rPr lang="pt-BR" dirty="0" err="1" smtClean="0"/>
-              <a:t>tablet</a:t>
-            </a:r>
+              <a:t>interface. </a:t>
+            </a:r>
+          </a:p>
+          <a:p>
+            <a:pPr marL="0" indent="0">
+              <a:buNone/>
+            </a:pPr>
             <a:r>
               <a:rPr lang="pt-BR" dirty="0" smtClean="0"/>
-              <a:t> furtado.</a:t>
-            </a:r>
-            <a:endParaRPr lang="pt-BR" dirty="0"/>
+              <a:t>Um </a:t>
+            </a:r>
+            <a:r>
+              <a:rPr lang="pt-BR" dirty="0"/>
+              <a:t>serviço vinculado permanece em execução somente enquanto outro componente do aplicativo estiver vinculado a ele. Vários componentes podem ser vinculados ao serviço de uma só vez, mas quando todos desfizerem o vínculo, o serviço será destruído.</a:t>
+            </a:r>
+          </a:p>
+        </p:txBody>
+      </p:sp>
+      <p:sp>
+        <p:nvSpPr>
+          <p:cNvPr id="7170" name="AutoShape 2" descr="http://upload.wikimedia.org/wikipedia/commons/d/dc/Broadcast.svg"/>
+          <p:cNvSpPr>
+            <a:spLocks noChangeAspect="1" noChangeArrowheads="1"/>
+          </p:cNvSpPr>
+          <p:nvPr/>
+        </p:nvSpPr>
+        <p:spPr bwMode="auto">
+          <a:xfrm>
+            <a:off x="1679575" y="-144463"/>
+            <a:ext cx="304800" cy="304801"/>
+          </a:xfrm>
+          <a:prstGeom prst="rect">
+            <a:avLst/>
+          </a:prstGeom>
+          <a:noFill/>
+        </p:spPr>
+        <p:txBody>
+          <a:bodyPr vert="horz" wrap="square" lIns="91440" tIns="45720" rIns="91440" bIns="45720" numCol="1" anchor="t" anchorCtr="0" compatLnSpc="1">
+            <a:prstTxWarp prst="textNoShape">
+              <a:avLst/>
+            </a:prstTxWarp>
+          </a:bodyPr>
+          <a:lstStyle/>
+          <a:p>
+            <a:endParaRPr lang="pt-BR"/>
+          </a:p>
+        </p:txBody>
+      </p:sp>
+      <p:sp>
+        <p:nvSpPr>
+          <p:cNvPr id="7172" name="AutoShape 4" descr="http://upload.wikimedia.org/wikipedia/commons/d/dc/Broadcast.svg"/>
+          <p:cNvSpPr>
+            <a:spLocks noChangeAspect="1" noChangeArrowheads="1"/>
+          </p:cNvSpPr>
+          <p:nvPr/>
+        </p:nvSpPr>
+        <p:spPr bwMode="auto">
+          <a:xfrm>
+            <a:off x="1679575" y="-144463"/>
+            <a:ext cx="304800" cy="304801"/>
+          </a:xfrm>
+          <a:prstGeom prst="rect">
+            <a:avLst/>
+          </a:prstGeom>
+          <a:noFill/>
+        </p:spPr>
+        <p:txBody>
+          <a:bodyPr vert="horz" wrap="square" lIns="91440" tIns="45720" rIns="91440" bIns="45720" numCol="1" anchor="t" anchorCtr="0" compatLnSpc="1">
+            <a:prstTxWarp prst="textNoShape">
+              <a:avLst/>
+            </a:prstTxWarp>
+          </a:bodyPr>
+          <a:lstStyle/>
+          <a:p>
+            <a:endParaRPr lang="pt-BR"/>
+          </a:p>
+        </p:txBody>
+      </p:sp>
+      <p:sp>
+        <p:nvSpPr>
+          <p:cNvPr id="7174" name="AutoShape 6" descr="http://upload.wikimedia.org/wikipedia/commons/d/dc/Broadcast.svg"/>
+          <p:cNvSpPr>
+            <a:spLocks noChangeAspect="1" noChangeArrowheads="1"/>
+          </p:cNvSpPr>
+          <p:nvPr/>
+        </p:nvSpPr>
+        <p:spPr bwMode="auto">
+          <a:xfrm>
+            <a:off x="1679575" y="-144463"/>
+            <a:ext cx="304800" cy="304801"/>
+          </a:xfrm>
+          <a:prstGeom prst="rect">
+            <a:avLst/>
+          </a:prstGeom>
+          <a:noFill/>
+        </p:spPr>
+        <p:txBody>
+          <a:bodyPr vert="horz" wrap="square" lIns="91440" tIns="45720" rIns="91440" bIns="45720" numCol="1" anchor="t" anchorCtr="0" compatLnSpc="1">
+            <a:prstTxWarp prst="textNoShape">
+              <a:avLst/>
+            </a:prstTxWarp>
+          </a:bodyPr>
+          <a:lstStyle/>
+          <a:p>
+            <a:endParaRPr lang="pt-BR"/>
           </a:p>
         </p:txBody>
       </p:sp>
     </p:spTree>
     <p:extLst>
       <p:ext uri="{BB962C8B-B14F-4D97-AF65-F5344CB8AC3E}">
-        <p14:creationId xmlns="" xmlns:p14="http://schemas.microsoft.com/office/powerpoint/2010/main" val="3876958284"/>
+        <p14:creationId xmlns:p14="http://schemas.microsoft.com/office/powerpoint/2010/main" val="3844577027"/>
       </p:ext>
     </p:extLst>
   </p:cSld>
   <p:clrMapOvr>
     <a:masterClrMapping/>
   </p:clrMapOvr>
+  <p:timing>
+    <p:tnLst>
+      <p:par>
+        <p:cTn id="1" dur="indefinite" restart="never" nodeType="tmRoot"/>
+      </p:par>
+    </p:tnLst>
+  </p:timing>
 </p:sld>
 </file>
 

</xml_diff>